<commit_message>
DB - Data Access with ADO.NET -HW -U
</commit_message>
<xml_diff>
--- a/Databases/07. Data Access with ADO.NET/ADO.NET.pptx
+++ b/Databases/07. Data Access with ADO.NET/ADO.NET.pptx
@@ -357,7 +357,7 @@
             <a:fld id="{3BF7C7B5-275F-4D1F-9AB4-9255447DBC73}" type="datetimeFigureOut">
               <a:rPr lang="en-US"/>
               <a:pPr/>
-              <a:t>11.07.2013</a:t>
+              <a:t>8/22/2014</a:t>
             </a:fld>
             <a:endParaRPr lang="en-US" dirty="0"/>
           </a:p>
@@ -588,7 +588,7 @@
             <a:fld id="{9B46F231-FB2B-4655-A644-E2477325E686}" type="datetimeFigureOut">
               <a:rPr lang="en-US"/>
               <a:pPr/>
-              <a:t>11.07.2013</a:t>
+              <a:t>8/22/2014</a:t>
             </a:fld>
             <a:endParaRPr lang="en-US" dirty="0"/>
           </a:p>
@@ -6960,1360 +6960,6 @@
           <a:chExt cx="0" cy="0"/>
         </a:xfrm>
       </p:grpSpPr>
-      <p:sp>
-        <p:nvSpPr>
-          <p:cNvPr id="14" name="Text Placeholder 3"/>
-          <p:cNvSpPr>
-            <a:spLocks noGrp="1"/>
-          </p:cNvSpPr>
-          <p:nvPr/>
-        </p:nvSpPr>
-        <p:spPr>
-          <a:xfrm>
-            <a:off x="457200" y="4492823"/>
-            <a:ext cx="3352800" cy="533400"/>
-          </a:xfrm>
-          <a:prstGeom prst="rect">
-            <a:avLst/>
-          </a:prstGeom>
-          <a:noFill/>
-        </p:spPr>
-        <p:txBody>
-          <a:bodyPr wrap="square" rtlCol="0">
-            <a:spAutoFit/>
-          </a:bodyPr>
-          <a:lstStyle>
-            <a:lvl1pPr marL="319088" indent="-319088" algn="l" rtl="0" eaLnBrk="0" fontAlgn="base" hangingPunct="0">
-              <a:spcBef>
-                <a:spcPct val="0"/>
-              </a:spcBef>
-              <a:spcAft>
-                <a:spcPct val="0"/>
-              </a:spcAft>
-              <a:buClr>
-                <a:schemeClr val="accent5">
-                  <a:lumMod val="40000"/>
-                  <a:lumOff val="60000"/>
-                </a:schemeClr>
-              </a:buClr>
-              <a:buSzPct val="70000"/>
-              <a:buFont typeface="Wingdings 2" pitchFamily="18" charset="2"/>
-              <a:buNone/>
-              <a:defRPr lang="en-US" sz="2800" b="1" kern="1200" dirty="0" smtClean="0">
-                <a:solidFill>
-                  <a:srgbClr val="DEFF9B"/>
-                </a:solidFill>
-                <a:effectLst>
-                  <a:outerShdw blurRad="38100" dist="38100" dir="2700000" algn="tl">
-                    <a:srgbClr val="000000">
-                      <a:alpha val="43137"/>
-                    </a:srgbClr>
-                  </a:outerShdw>
-                </a:effectLst>
-                <a:latin typeface="Corbel" pitchFamily="34" charset="0"/>
-                <a:ea typeface="+mn-ea"/>
-                <a:cs typeface="+mn-cs"/>
-              </a:defRPr>
-            </a:lvl1pPr>
-            <a:lvl2pPr marL="630238" indent="-273050" algn="l" rtl="0" eaLnBrk="0" fontAlgn="base" hangingPunct="0">
-              <a:spcBef>
-                <a:spcPct val="20000"/>
-              </a:spcBef>
-              <a:spcAft>
-                <a:spcPct val="0"/>
-              </a:spcAft>
-              <a:buClr>
-                <a:schemeClr val="accent2">
-                  <a:lumMod val="60000"/>
-                  <a:lumOff val="40000"/>
-                </a:schemeClr>
-              </a:buClr>
-              <a:buFont typeface="Wingdings 2" pitchFamily="18" charset="2"/>
-              <a:buChar char=""/>
-              <a:defRPr sz="3000" b="1" kern="1200">
-                <a:solidFill>
-                  <a:schemeClr val="tx1">
-                    <a:lumMod val="20000"/>
-                    <a:lumOff val="80000"/>
-                  </a:schemeClr>
-                </a:solidFill>
-                <a:effectLst>
-                  <a:outerShdw blurRad="38100" dist="38100" dir="2700000" algn="tl">
-                    <a:srgbClr val="000000">
-                      <a:alpha val="43137"/>
-                    </a:srgbClr>
-                  </a:outerShdw>
-                </a:effectLst>
-                <a:latin typeface="+mn-lt"/>
-                <a:ea typeface="+mn-ea"/>
-                <a:cs typeface="+mn-cs"/>
-              </a:defRPr>
-            </a:lvl2pPr>
-            <a:lvl3pPr marL="922338" indent="-273050" algn="l" rtl="0" eaLnBrk="0" fontAlgn="base" hangingPunct="0">
-              <a:spcBef>
-                <a:spcPct val="20000"/>
-              </a:spcBef>
-              <a:spcAft>
-                <a:spcPct val="0"/>
-              </a:spcAft>
-              <a:buClr>
-                <a:schemeClr val="tx1">
-                  <a:lumMod val="50000"/>
-                </a:schemeClr>
-              </a:buClr>
-              <a:buFont typeface="Wingdings 2" pitchFamily="18" charset="2"/>
-              <a:buChar char=""/>
-              <a:defRPr sz="2800" b="1" kern="1200">
-                <a:solidFill>
-                  <a:schemeClr val="tx1">
-                    <a:lumMod val="20000"/>
-                    <a:lumOff val="80000"/>
-                  </a:schemeClr>
-                </a:solidFill>
-                <a:effectLst>
-                  <a:outerShdw blurRad="38100" dist="38100" dir="2700000" algn="tl">
-                    <a:srgbClr val="000000">
-                      <a:alpha val="43137"/>
-                    </a:srgbClr>
-                  </a:outerShdw>
-                </a:effectLst>
-                <a:latin typeface="+mn-lt"/>
-                <a:ea typeface="+mn-ea"/>
-                <a:cs typeface="+mn-cs"/>
-              </a:defRPr>
-            </a:lvl3pPr>
-            <a:lvl4pPr marL="1187450" indent="-228600" algn="l" rtl="0" eaLnBrk="0" fontAlgn="base" hangingPunct="0">
-              <a:spcBef>
-                <a:spcPct val="20000"/>
-              </a:spcBef>
-              <a:spcAft>
-                <a:spcPct val="0"/>
-              </a:spcAft>
-              <a:buClr>
-                <a:srgbClr val="F8BD52"/>
-              </a:buClr>
-              <a:buFont typeface="Wingdings 2" pitchFamily="18" charset="2"/>
-              <a:buChar char=""/>
-              <a:defRPr sz="2600" b="1" kern="1200">
-                <a:solidFill>
-                  <a:schemeClr val="tx1">
-                    <a:lumMod val="20000"/>
-                    <a:lumOff val="80000"/>
-                  </a:schemeClr>
-                </a:solidFill>
-                <a:effectLst>
-                  <a:outerShdw blurRad="38100" dist="38100" dir="2700000" algn="tl">
-                    <a:srgbClr val="000000">
-                      <a:alpha val="43137"/>
-                    </a:srgbClr>
-                  </a:outerShdw>
-                </a:effectLst>
-                <a:latin typeface="+mn-lt"/>
-                <a:ea typeface="+mn-ea"/>
-                <a:cs typeface="+mn-cs"/>
-              </a:defRPr>
-            </a:lvl4pPr>
-            <a:lvl5pPr marL="1425575" indent="-228600" algn="l" rtl="0" eaLnBrk="0" fontAlgn="base" hangingPunct="0">
-              <a:spcBef>
-                <a:spcPct val="20000"/>
-              </a:spcBef>
-              <a:spcAft>
-                <a:spcPct val="0"/>
-              </a:spcAft>
-              <a:buClr>
-                <a:srgbClr val="46A6BD"/>
-              </a:buClr>
-              <a:buFont typeface="Wingdings 2" pitchFamily="18" charset="2"/>
-              <a:buChar char=""/>
-              <a:defRPr sz="2400" b="1" kern="1200">
-                <a:solidFill>
-                  <a:schemeClr val="tx1">
-                    <a:lumMod val="20000"/>
-                    <a:lumOff val="80000"/>
-                  </a:schemeClr>
-                </a:solidFill>
-                <a:effectLst>
-                  <a:outerShdw blurRad="38100" dist="38100" dir="2700000" algn="tl">
-                    <a:srgbClr val="000000">
-                      <a:alpha val="43137"/>
-                    </a:srgbClr>
-                  </a:outerShdw>
-                </a:effectLst>
-                <a:latin typeface="+mn-lt"/>
-                <a:ea typeface="+mn-ea"/>
-                <a:cs typeface="+mn-cs"/>
-              </a:defRPr>
-            </a:lvl5pPr>
-            <a:lvl6pPr marL="1673352" indent="-228600" algn="l" rtl="0" eaLnBrk="1" latinLnBrk="0" hangingPunct="1">
-              <a:spcBef>
-                <a:spcPct val="20000"/>
-              </a:spcBef>
-              <a:buClr>
-                <a:schemeClr val="accent6"/>
-              </a:buClr>
-              <a:buFont typeface="Wingdings 2"/>
-              <a:buChar char=""/>
-              <a:defRPr sz="1800" kern="1200">
-                <a:solidFill>
-                  <a:schemeClr val="tx1"/>
-                </a:solidFill>
-                <a:latin typeface="+mn-lt"/>
-                <a:ea typeface="+mn-ea"/>
-                <a:cs typeface="+mn-cs"/>
-              </a:defRPr>
-            </a:lvl6pPr>
-            <a:lvl7pPr marL="1911096" indent="-228600" algn="l" rtl="0" eaLnBrk="1" latinLnBrk="0" hangingPunct="1">
-              <a:spcBef>
-                <a:spcPct val="20000"/>
-              </a:spcBef>
-              <a:buClr>
-                <a:schemeClr val="tx2"/>
-              </a:buClr>
-              <a:buFont typeface="Wingdings 2"/>
-              <a:buChar char=""/>
-              <a:defRPr sz="1600" kern="1200">
-                <a:solidFill>
-                  <a:schemeClr val="tx1"/>
-                </a:solidFill>
-                <a:latin typeface="+mn-lt"/>
-                <a:ea typeface="+mn-ea"/>
-                <a:cs typeface="+mn-cs"/>
-              </a:defRPr>
-            </a:lvl7pPr>
-            <a:lvl8pPr marL="2121408" indent="-182880" algn="l" rtl="0" eaLnBrk="1" latinLnBrk="0" hangingPunct="1">
-              <a:spcBef>
-                <a:spcPct val="20000"/>
-              </a:spcBef>
-              <a:buClr>
-                <a:schemeClr val="tx2"/>
-              </a:buClr>
-              <a:buFont typeface="Wingdings 2"/>
-              <a:buChar char=""/>
-              <a:defRPr sz="1400" kern="1200">
-                <a:solidFill>
-                  <a:schemeClr val="tx1"/>
-                </a:solidFill>
-                <a:latin typeface="+mn-lt"/>
-                <a:ea typeface="+mn-ea"/>
-                <a:cs typeface="+mn-cs"/>
-              </a:defRPr>
-            </a:lvl8pPr>
-            <a:lvl9pPr marL="2322576" indent="-182880" algn="l" rtl="0" eaLnBrk="1" latinLnBrk="0" hangingPunct="1">
-              <a:spcBef>
-                <a:spcPct val="20000"/>
-              </a:spcBef>
-              <a:buClr>
-                <a:schemeClr val="tx2"/>
-              </a:buClr>
-              <a:buFont typeface="Wingdings 2"/>
-              <a:buChar char=""/>
-              <a:defRPr sz="1400" kern="1200">
-                <a:solidFill>
-                  <a:schemeClr val="tx1"/>
-                </a:solidFill>
-                <a:latin typeface="+mn-lt"/>
-                <a:ea typeface="+mn-ea"/>
-                <a:cs typeface="+mn-cs"/>
-              </a:defRPr>
-            </a:lvl9pPr>
-          </a:lstStyle>
-          <a:p>
-            <a:r>
-              <a:rPr lang="en-US" dirty="0"/>
-              <a:t>Svetlin Nakov</a:t>
-            </a:r>
-          </a:p>
-          <a:p>
-            <a:endParaRPr lang="en-US" dirty="0"/>
-          </a:p>
-        </p:txBody>
-      </p:sp>
-      <p:sp>
-        <p:nvSpPr>
-          <p:cNvPr id="15" name="Text Placeholder 4"/>
-          <p:cNvSpPr>
-            <a:spLocks noGrp="1"/>
-          </p:cNvSpPr>
-          <p:nvPr/>
-        </p:nvSpPr>
-        <p:spPr>
-          <a:xfrm>
-            <a:off x="469900" y="5754469"/>
-            <a:ext cx="3352800" cy="646331"/>
-          </a:xfrm>
-          <a:prstGeom prst="rect">
-            <a:avLst/>
-          </a:prstGeom>
-          <a:noFill/>
-        </p:spPr>
-        <p:txBody>
-          <a:bodyPr wrap="square" rtlCol="0">
-            <a:spAutoFit/>
-          </a:bodyPr>
-          <a:lstStyle>
-            <a:lvl1pPr marL="0" indent="0" algn="l" rtl="0" eaLnBrk="0" fontAlgn="base" hangingPunct="0">
-              <a:spcBef>
-                <a:spcPct val="0"/>
-              </a:spcBef>
-              <a:spcAft>
-                <a:spcPct val="0"/>
-              </a:spcAft>
-              <a:buClr>
-                <a:schemeClr val="accent5">
-                  <a:lumMod val="40000"/>
-                  <a:lumOff val="60000"/>
-                </a:schemeClr>
-              </a:buClr>
-              <a:buSzPct val="70000"/>
-              <a:buFont typeface="Wingdings 2" pitchFamily="18" charset="2"/>
-              <a:buNone/>
-              <a:defRPr lang="en-US" sz="1800" b="1" kern="1200" dirty="0">
-                <a:solidFill>
-                  <a:schemeClr val="tx2">
-                    <a:lumMod val="20000"/>
-                    <a:lumOff val="80000"/>
-                  </a:schemeClr>
-                </a:solidFill>
-                <a:effectLst>
-                  <a:outerShdw blurRad="38100" dist="38100" dir="2700000" algn="tl">
-                    <a:srgbClr val="000000">
-                      <a:alpha val="43137"/>
-                    </a:srgbClr>
-                  </a:outerShdw>
-                </a:effectLst>
-                <a:latin typeface="Corbel" pitchFamily="34" charset="0"/>
-                <a:ea typeface="+mn-ea"/>
-                <a:cs typeface="+mn-cs"/>
-              </a:defRPr>
-            </a:lvl1pPr>
-            <a:lvl2pPr marL="630238" indent="-273050" algn="l" rtl="0" eaLnBrk="0" fontAlgn="base" hangingPunct="0">
-              <a:spcBef>
-                <a:spcPct val="20000"/>
-              </a:spcBef>
-              <a:spcAft>
-                <a:spcPct val="0"/>
-              </a:spcAft>
-              <a:buClr>
-                <a:schemeClr val="accent2">
-                  <a:lumMod val="60000"/>
-                  <a:lumOff val="40000"/>
-                </a:schemeClr>
-              </a:buClr>
-              <a:buFont typeface="Wingdings 2" pitchFamily="18" charset="2"/>
-              <a:buChar char=""/>
-              <a:defRPr sz="3000" b="1" kern="1200">
-                <a:solidFill>
-                  <a:schemeClr val="tx1">
-                    <a:lumMod val="20000"/>
-                    <a:lumOff val="80000"/>
-                  </a:schemeClr>
-                </a:solidFill>
-                <a:effectLst>
-                  <a:outerShdw blurRad="38100" dist="38100" dir="2700000" algn="tl">
-                    <a:srgbClr val="000000">
-                      <a:alpha val="43137"/>
-                    </a:srgbClr>
-                  </a:outerShdw>
-                </a:effectLst>
-                <a:latin typeface="+mn-lt"/>
-                <a:ea typeface="+mn-ea"/>
-                <a:cs typeface="+mn-cs"/>
-              </a:defRPr>
-            </a:lvl2pPr>
-            <a:lvl3pPr marL="922338" indent="-273050" algn="l" rtl="0" eaLnBrk="0" fontAlgn="base" hangingPunct="0">
-              <a:spcBef>
-                <a:spcPct val="20000"/>
-              </a:spcBef>
-              <a:spcAft>
-                <a:spcPct val="0"/>
-              </a:spcAft>
-              <a:buClr>
-                <a:schemeClr val="tx1">
-                  <a:lumMod val="50000"/>
-                </a:schemeClr>
-              </a:buClr>
-              <a:buFont typeface="Wingdings 2" pitchFamily="18" charset="2"/>
-              <a:buChar char=""/>
-              <a:defRPr sz="2800" b="1" kern="1200">
-                <a:solidFill>
-                  <a:schemeClr val="tx1">
-                    <a:lumMod val="20000"/>
-                    <a:lumOff val="80000"/>
-                  </a:schemeClr>
-                </a:solidFill>
-                <a:effectLst>
-                  <a:outerShdw blurRad="38100" dist="38100" dir="2700000" algn="tl">
-                    <a:srgbClr val="000000">
-                      <a:alpha val="43137"/>
-                    </a:srgbClr>
-                  </a:outerShdw>
-                </a:effectLst>
-                <a:latin typeface="+mn-lt"/>
-                <a:ea typeface="+mn-ea"/>
-                <a:cs typeface="+mn-cs"/>
-              </a:defRPr>
-            </a:lvl3pPr>
-            <a:lvl4pPr marL="1187450" indent="-228600" algn="l" rtl="0" eaLnBrk="0" fontAlgn="base" hangingPunct="0">
-              <a:spcBef>
-                <a:spcPct val="20000"/>
-              </a:spcBef>
-              <a:spcAft>
-                <a:spcPct val="0"/>
-              </a:spcAft>
-              <a:buClr>
-                <a:srgbClr val="F8BD52"/>
-              </a:buClr>
-              <a:buFont typeface="Wingdings 2" pitchFamily="18" charset="2"/>
-              <a:buChar char=""/>
-              <a:defRPr sz="2600" b="1" kern="1200">
-                <a:solidFill>
-                  <a:schemeClr val="tx1">
-                    <a:lumMod val="20000"/>
-                    <a:lumOff val="80000"/>
-                  </a:schemeClr>
-                </a:solidFill>
-                <a:effectLst>
-                  <a:outerShdw blurRad="38100" dist="38100" dir="2700000" algn="tl">
-                    <a:srgbClr val="000000">
-                      <a:alpha val="43137"/>
-                    </a:srgbClr>
-                  </a:outerShdw>
-                </a:effectLst>
-                <a:latin typeface="+mn-lt"/>
-                <a:ea typeface="+mn-ea"/>
-                <a:cs typeface="+mn-cs"/>
-              </a:defRPr>
-            </a:lvl4pPr>
-            <a:lvl5pPr marL="1425575" indent="-228600" algn="l" rtl="0" eaLnBrk="0" fontAlgn="base" hangingPunct="0">
-              <a:spcBef>
-                <a:spcPct val="20000"/>
-              </a:spcBef>
-              <a:spcAft>
-                <a:spcPct val="0"/>
-              </a:spcAft>
-              <a:buClr>
-                <a:srgbClr val="46A6BD"/>
-              </a:buClr>
-              <a:buFont typeface="Wingdings 2" pitchFamily="18" charset="2"/>
-              <a:buChar char=""/>
-              <a:defRPr sz="2400" b="1" kern="1200">
-                <a:solidFill>
-                  <a:schemeClr val="tx1">
-                    <a:lumMod val="20000"/>
-                    <a:lumOff val="80000"/>
-                  </a:schemeClr>
-                </a:solidFill>
-                <a:effectLst>
-                  <a:outerShdw blurRad="38100" dist="38100" dir="2700000" algn="tl">
-                    <a:srgbClr val="000000">
-                      <a:alpha val="43137"/>
-                    </a:srgbClr>
-                  </a:outerShdw>
-                </a:effectLst>
-                <a:latin typeface="+mn-lt"/>
-                <a:ea typeface="+mn-ea"/>
-                <a:cs typeface="+mn-cs"/>
-              </a:defRPr>
-            </a:lvl5pPr>
-            <a:lvl6pPr marL="1673352" indent="-228600" algn="l" rtl="0" eaLnBrk="1" latinLnBrk="0" hangingPunct="1">
-              <a:spcBef>
-                <a:spcPct val="20000"/>
-              </a:spcBef>
-              <a:buClr>
-                <a:schemeClr val="accent6"/>
-              </a:buClr>
-              <a:buFont typeface="Wingdings 2"/>
-              <a:buChar char=""/>
-              <a:defRPr sz="1800" kern="1200">
-                <a:solidFill>
-                  <a:schemeClr val="tx1"/>
-                </a:solidFill>
-                <a:latin typeface="+mn-lt"/>
-                <a:ea typeface="+mn-ea"/>
-                <a:cs typeface="+mn-cs"/>
-              </a:defRPr>
-            </a:lvl6pPr>
-            <a:lvl7pPr marL="1911096" indent="-228600" algn="l" rtl="0" eaLnBrk="1" latinLnBrk="0" hangingPunct="1">
-              <a:spcBef>
-                <a:spcPct val="20000"/>
-              </a:spcBef>
-              <a:buClr>
-                <a:schemeClr val="tx2"/>
-              </a:buClr>
-              <a:buFont typeface="Wingdings 2"/>
-              <a:buChar char=""/>
-              <a:defRPr sz="1600" kern="1200">
-                <a:solidFill>
-                  <a:schemeClr val="tx1"/>
-                </a:solidFill>
-                <a:latin typeface="+mn-lt"/>
-                <a:ea typeface="+mn-ea"/>
-                <a:cs typeface="+mn-cs"/>
-              </a:defRPr>
-            </a:lvl7pPr>
-            <a:lvl8pPr marL="2121408" indent="-182880" algn="l" rtl="0" eaLnBrk="1" latinLnBrk="0" hangingPunct="1">
-              <a:spcBef>
-                <a:spcPct val="20000"/>
-              </a:spcBef>
-              <a:buClr>
-                <a:schemeClr val="tx2"/>
-              </a:buClr>
-              <a:buFont typeface="Wingdings 2"/>
-              <a:buChar char=""/>
-              <a:defRPr sz="1400" kern="1200">
-                <a:solidFill>
-                  <a:schemeClr val="tx1"/>
-                </a:solidFill>
-                <a:latin typeface="+mn-lt"/>
-                <a:ea typeface="+mn-ea"/>
-                <a:cs typeface="+mn-cs"/>
-              </a:defRPr>
-            </a:lvl8pPr>
-            <a:lvl9pPr marL="2322576" indent="-182880" algn="l" rtl="0" eaLnBrk="1" latinLnBrk="0" hangingPunct="1">
-              <a:spcBef>
-                <a:spcPct val="20000"/>
-              </a:spcBef>
-              <a:buClr>
-                <a:schemeClr val="tx2"/>
-              </a:buClr>
-              <a:buFont typeface="Wingdings 2"/>
-              <a:buChar char=""/>
-              <a:defRPr sz="1400" kern="1200">
-                <a:solidFill>
-                  <a:schemeClr val="tx1"/>
-                </a:solidFill>
-                <a:latin typeface="+mn-lt"/>
-                <a:ea typeface="+mn-ea"/>
-                <a:cs typeface="+mn-cs"/>
-              </a:defRPr>
-            </a:lvl9pPr>
-          </a:lstStyle>
-          <a:p>
-            <a:r>
-              <a:rPr lang="en-US" dirty="0" smtClean="0"/>
-              <a:t>Telerik Software Academy</a:t>
-            </a:r>
-            <a:endParaRPr lang="en-US" dirty="0"/>
-          </a:p>
-          <a:p>
-            <a:endParaRPr lang="en-US" dirty="0"/>
-          </a:p>
-        </p:txBody>
-      </p:sp>
-      <p:sp>
-        <p:nvSpPr>
-          <p:cNvPr id="16" name="Text Placeholder 5"/>
-          <p:cNvSpPr>
-            <a:spLocks noGrp="1"/>
-          </p:cNvSpPr>
-          <p:nvPr/>
-        </p:nvSpPr>
-        <p:spPr>
-          <a:xfrm>
-            <a:off x="469900" y="6059269"/>
-            <a:ext cx="3352800" cy="338554"/>
-          </a:xfrm>
-          <a:prstGeom prst="rect">
-            <a:avLst/>
-          </a:prstGeom>
-          <a:noFill/>
-        </p:spPr>
-        <p:txBody>
-          <a:bodyPr wrap="square" rtlCol="0">
-            <a:spAutoFit/>
-          </a:bodyPr>
-          <a:lstStyle>
-            <a:lvl1pPr marL="319088" indent="-319088" algn="l" rtl="0" eaLnBrk="0" fontAlgn="base" hangingPunct="0">
-              <a:spcBef>
-                <a:spcPct val="0"/>
-              </a:spcBef>
-              <a:spcAft>
-                <a:spcPct val="0"/>
-              </a:spcAft>
-              <a:buClr>
-                <a:schemeClr val="accent5">
-                  <a:lumMod val="40000"/>
-                  <a:lumOff val="60000"/>
-                </a:schemeClr>
-              </a:buClr>
-              <a:buSzPct val="70000"/>
-              <a:buFont typeface="Wingdings 2" pitchFamily="18" charset="2"/>
-              <a:buNone/>
-              <a:defRPr lang="en-US" sz="1600" b="1" kern="1200" dirty="0" smtClean="0">
-                <a:solidFill>
-                  <a:srgbClr val="0EFE58"/>
-                </a:solidFill>
-                <a:effectLst>
-                  <a:outerShdw blurRad="38100" dist="38100" dir="2700000" algn="tl">
-                    <a:srgbClr val="000000">
-                      <a:alpha val="43137"/>
-                    </a:srgbClr>
-                  </a:outerShdw>
-                </a:effectLst>
-                <a:latin typeface="Corbel" pitchFamily="34" charset="0"/>
-                <a:ea typeface="+mn-ea"/>
-                <a:cs typeface="+mn-cs"/>
-              </a:defRPr>
-            </a:lvl1pPr>
-            <a:lvl2pPr marL="630238" indent="-273050" algn="l" rtl="0" eaLnBrk="0" fontAlgn="base" hangingPunct="0">
-              <a:spcBef>
-                <a:spcPct val="20000"/>
-              </a:spcBef>
-              <a:spcAft>
-                <a:spcPct val="0"/>
-              </a:spcAft>
-              <a:buClr>
-                <a:schemeClr val="accent2">
-                  <a:lumMod val="60000"/>
-                  <a:lumOff val="40000"/>
-                </a:schemeClr>
-              </a:buClr>
-              <a:buFont typeface="Wingdings 2" pitchFamily="18" charset="2"/>
-              <a:buChar char=""/>
-              <a:defRPr sz="3000" b="1" kern="1200">
-                <a:solidFill>
-                  <a:schemeClr val="tx1">
-                    <a:lumMod val="20000"/>
-                    <a:lumOff val="80000"/>
-                  </a:schemeClr>
-                </a:solidFill>
-                <a:effectLst>
-                  <a:outerShdw blurRad="38100" dist="38100" dir="2700000" algn="tl">
-                    <a:srgbClr val="000000">
-                      <a:alpha val="43137"/>
-                    </a:srgbClr>
-                  </a:outerShdw>
-                </a:effectLst>
-                <a:latin typeface="+mn-lt"/>
-                <a:ea typeface="+mn-ea"/>
-                <a:cs typeface="+mn-cs"/>
-              </a:defRPr>
-            </a:lvl2pPr>
-            <a:lvl3pPr marL="922338" indent="-273050" algn="l" rtl="0" eaLnBrk="0" fontAlgn="base" hangingPunct="0">
-              <a:spcBef>
-                <a:spcPct val="20000"/>
-              </a:spcBef>
-              <a:spcAft>
-                <a:spcPct val="0"/>
-              </a:spcAft>
-              <a:buClr>
-                <a:schemeClr val="tx1">
-                  <a:lumMod val="50000"/>
-                </a:schemeClr>
-              </a:buClr>
-              <a:buFont typeface="Wingdings 2" pitchFamily="18" charset="2"/>
-              <a:buChar char=""/>
-              <a:defRPr sz="2800" b="1" kern="1200">
-                <a:solidFill>
-                  <a:schemeClr val="tx1">
-                    <a:lumMod val="20000"/>
-                    <a:lumOff val="80000"/>
-                  </a:schemeClr>
-                </a:solidFill>
-                <a:effectLst>
-                  <a:outerShdw blurRad="38100" dist="38100" dir="2700000" algn="tl">
-                    <a:srgbClr val="000000">
-                      <a:alpha val="43137"/>
-                    </a:srgbClr>
-                  </a:outerShdw>
-                </a:effectLst>
-                <a:latin typeface="+mn-lt"/>
-                <a:ea typeface="+mn-ea"/>
-                <a:cs typeface="+mn-cs"/>
-              </a:defRPr>
-            </a:lvl3pPr>
-            <a:lvl4pPr marL="1187450" indent="-228600" algn="l" rtl="0" eaLnBrk="0" fontAlgn="base" hangingPunct="0">
-              <a:spcBef>
-                <a:spcPct val="20000"/>
-              </a:spcBef>
-              <a:spcAft>
-                <a:spcPct val="0"/>
-              </a:spcAft>
-              <a:buClr>
-                <a:srgbClr val="F8BD52"/>
-              </a:buClr>
-              <a:buFont typeface="Wingdings 2" pitchFamily="18" charset="2"/>
-              <a:buChar char=""/>
-              <a:defRPr sz="2600" b="1" kern="1200">
-                <a:solidFill>
-                  <a:schemeClr val="tx1">
-                    <a:lumMod val="20000"/>
-                    <a:lumOff val="80000"/>
-                  </a:schemeClr>
-                </a:solidFill>
-                <a:effectLst>
-                  <a:outerShdw blurRad="38100" dist="38100" dir="2700000" algn="tl">
-                    <a:srgbClr val="000000">
-                      <a:alpha val="43137"/>
-                    </a:srgbClr>
-                  </a:outerShdw>
-                </a:effectLst>
-                <a:latin typeface="+mn-lt"/>
-                <a:ea typeface="+mn-ea"/>
-                <a:cs typeface="+mn-cs"/>
-              </a:defRPr>
-            </a:lvl4pPr>
-            <a:lvl5pPr marL="1425575" indent="-228600" algn="l" rtl="0" eaLnBrk="0" fontAlgn="base" hangingPunct="0">
-              <a:spcBef>
-                <a:spcPct val="20000"/>
-              </a:spcBef>
-              <a:spcAft>
-                <a:spcPct val="0"/>
-              </a:spcAft>
-              <a:buClr>
-                <a:srgbClr val="46A6BD"/>
-              </a:buClr>
-              <a:buFont typeface="Wingdings 2" pitchFamily="18" charset="2"/>
-              <a:buChar char=""/>
-              <a:defRPr sz="2400" b="1" kern="1200">
-                <a:solidFill>
-                  <a:schemeClr val="tx1">
-                    <a:lumMod val="20000"/>
-                    <a:lumOff val="80000"/>
-                  </a:schemeClr>
-                </a:solidFill>
-                <a:effectLst>
-                  <a:outerShdw blurRad="38100" dist="38100" dir="2700000" algn="tl">
-                    <a:srgbClr val="000000">
-                      <a:alpha val="43137"/>
-                    </a:srgbClr>
-                  </a:outerShdw>
-                </a:effectLst>
-                <a:latin typeface="+mn-lt"/>
-                <a:ea typeface="+mn-ea"/>
-                <a:cs typeface="+mn-cs"/>
-              </a:defRPr>
-            </a:lvl5pPr>
-            <a:lvl6pPr marL="1673352" indent="-228600" algn="l" rtl="0" eaLnBrk="1" latinLnBrk="0" hangingPunct="1">
-              <a:spcBef>
-                <a:spcPct val="20000"/>
-              </a:spcBef>
-              <a:buClr>
-                <a:schemeClr val="accent6"/>
-              </a:buClr>
-              <a:buFont typeface="Wingdings 2"/>
-              <a:buChar char=""/>
-              <a:defRPr sz="1800" kern="1200">
-                <a:solidFill>
-                  <a:schemeClr val="tx1"/>
-                </a:solidFill>
-                <a:latin typeface="+mn-lt"/>
-                <a:ea typeface="+mn-ea"/>
-                <a:cs typeface="+mn-cs"/>
-              </a:defRPr>
-            </a:lvl6pPr>
-            <a:lvl7pPr marL="1911096" indent="-228600" algn="l" rtl="0" eaLnBrk="1" latinLnBrk="0" hangingPunct="1">
-              <a:spcBef>
-                <a:spcPct val="20000"/>
-              </a:spcBef>
-              <a:buClr>
-                <a:schemeClr val="tx2"/>
-              </a:buClr>
-              <a:buFont typeface="Wingdings 2"/>
-              <a:buChar char=""/>
-              <a:defRPr sz="1600" kern="1200">
-                <a:solidFill>
-                  <a:schemeClr val="tx1"/>
-                </a:solidFill>
-                <a:latin typeface="+mn-lt"/>
-                <a:ea typeface="+mn-ea"/>
-                <a:cs typeface="+mn-cs"/>
-              </a:defRPr>
-            </a:lvl7pPr>
-            <a:lvl8pPr marL="2121408" indent="-182880" algn="l" rtl="0" eaLnBrk="1" latinLnBrk="0" hangingPunct="1">
-              <a:spcBef>
-                <a:spcPct val="20000"/>
-              </a:spcBef>
-              <a:buClr>
-                <a:schemeClr val="tx2"/>
-              </a:buClr>
-              <a:buFont typeface="Wingdings 2"/>
-              <a:buChar char=""/>
-              <a:defRPr sz="1400" kern="1200">
-                <a:solidFill>
-                  <a:schemeClr val="tx1"/>
-                </a:solidFill>
-                <a:latin typeface="+mn-lt"/>
-                <a:ea typeface="+mn-ea"/>
-                <a:cs typeface="+mn-cs"/>
-              </a:defRPr>
-            </a:lvl8pPr>
-            <a:lvl9pPr marL="2322576" indent="-182880" algn="l" rtl="0" eaLnBrk="1" latinLnBrk="0" hangingPunct="1">
-              <a:spcBef>
-                <a:spcPct val="20000"/>
-              </a:spcBef>
-              <a:buClr>
-                <a:schemeClr val="tx2"/>
-              </a:buClr>
-              <a:buFont typeface="Wingdings 2"/>
-              <a:buChar char=""/>
-              <a:defRPr sz="1400" kern="1200">
-                <a:solidFill>
-                  <a:schemeClr val="tx1"/>
-                </a:solidFill>
-                <a:latin typeface="+mn-lt"/>
-                <a:ea typeface="+mn-ea"/>
-                <a:cs typeface="+mn-cs"/>
-              </a:defRPr>
-            </a:lvl9pPr>
-          </a:lstStyle>
-          <a:p>
-            <a:r>
-              <a:rPr lang="en-US" dirty="0" smtClean="0">
-                <a:hlinkClick r:id="rId3"/>
-              </a:rPr>
-              <a:t>http://academy.telerik.com</a:t>
-            </a:r>
-            <a:r>
-              <a:rPr lang="en-US" dirty="0" smtClean="0"/>
-              <a:t> </a:t>
-            </a:r>
-            <a:endParaRPr lang="en-US" dirty="0"/>
-          </a:p>
-        </p:txBody>
-      </p:sp>
-      <p:sp>
-        <p:nvSpPr>
-          <p:cNvPr id="17" name="Text Placeholder 6"/>
-          <p:cNvSpPr>
-            <a:spLocks noGrp="1"/>
-          </p:cNvSpPr>
-          <p:nvPr/>
-        </p:nvSpPr>
-        <p:spPr>
-          <a:xfrm>
-            <a:off x="469899" y="4950023"/>
-            <a:ext cx="3874333" cy="446276"/>
-          </a:xfrm>
-          <a:prstGeom prst="rect">
-            <a:avLst/>
-          </a:prstGeom>
-          <a:noFill/>
-        </p:spPr>
-        <p:txBody>
-          <a:bodyPr wrap="square" rtlCol="0">
-            <a:spAutoFit/>
-          </a:bodyPr>
-          <a:lstStyle>
-            <a:lvl1pPr marL="319088" indent="-319088" algn="l" rtl="0" eaLnBrk="0" fontAlgn="base" hangingPunct="0">
-              <a:spcBef>
-                <a:spcPct val="0"/>
-              </a:spcBef>
-              <a:spcAft>
-                <a:spcPct val="0"/>
-              </a:spcAft>
-              <a:buClr>
-                <a:schemeClr val="accent5">
-                  <a:lumMod val="40000"/>
-                  <a:lumOff val="60000"/>
-                </a:schemeClr>
-              </a:buClr>
-              <a:buSzPct val="70000"/>
-              <a:buFont typeface="Wingdings 2" pitchFamily="18" charset="2"/>
-              <a:buNone/>
-              <a:defRPr lang="en-US" sz="2300" b="1" kern="1200" dirty="0" smtClean="0">
-                <a:solidFill>
-                  <a:schemeClr val="tx2">
-                    <a:lumMod val="50000"/>
-                  </a:schemeClr>
-                </a:solidFill>
-                <a:effectLst>
-                  <a:outerShdw blurRad="38100" dist="38100" dir="2700000" algn="tl">
-                    <a:srgbClr val="000000">
-                      <a:alpha val="43137"/>
-                    </a:srgbClr>
-                  </a:outerShdw>
-                </a:effectLst>
-                <a:latin typeface="Corbel" pitchFamily="34" charset="0"/>
-                <a:ea typeface="+mn-ea"/>
-                <a:cs typeface="+mn-cs"/>
-              </a:defRPr>
-            </a:lvl1pPr>
-            <a:lvl2pPr marL="630238" indent="-273050" algn="l" rtl="0" eaLnBrk="0" fontAlgn="base" hangingPunct="0">
-              <a:spcBef>
-                <a:spcPct val="20000"/>
-              </a:spcBef>
-              <a:spcAft>
-                <a:spcPct val="0"/>
-              </a:spcAft>
-              <a:buClr>
-                <a:schemeClr val="accent2">
-                  <a:lumMod val="60000"/>
-                  <a:lumOff val="40000"/>
-                </a:schemeClr>
-              </a:buClr>
-              <a:buFont typeface="Wingdings 2" pitchFamily="18" charset="2"/>
-              <a:buChar char=""/>
-              <a:defRPr sz="3000" b="1" kern="1200">
-                <a:solidFill>
-                  <a:schemeClr val="tx1">
-                    <a:lumMod val="20000"/>
-                    <a:lumOff val="80000"/>
-                  </a:schemeClr>
-                </a:solidFill>
-                <a:effectLst>
-                  <a:outerShdw blurRad="38100" dist="38100" dir="2700000" algn="tl">
-                    <a:srgbClr val="000000">
-                      <a:alpha val="43137"/>
-                    </a:srgbClr>
-                  </a:outerShdw>
-                </a:effectLst>
-                <a:latin typeface="+mn-lt"/>
-                <a:ea typeface="+mn-ea"/>
-                <a:cs typeface="+mn-cs"/>
-              </a:defRPr>
-            </a:lvl2pPr>
-            <a:lvl3pPr marL="922338" indent="-273050" algn="l" rtl="0" eaLnBrk="0" fontAlgn="base" hangingPunct="0">
-              <a:spcBef>
-                <a:spcPct val="20000"/>
-              </a:spcBef>
-              <a:spcAft>
-                <a:spcPct val="0"/>
-              </a:spcAft>
-              <a:buClr>
-                <a:schemeClr val="tx1">
-                  <a:lumMod val="50000"/>
-                </a:schemeClr>
-              </a:buClr>
-              <a:buFont typeface="Wingdings 2" pitchFamily="18" charset="2"/>
-              <a:buChar char=""/>
-              <a:defRPr sz="2800" b="1" kern="1200">
-                <a:solidFill>
-                  <a:schemeClr val="tx1">
-                    <a:lumMod val="20000"/>
-                    <a:lumOff val="80000"/>
-                  </a:schemeClr>
-                </a:solidFill>
-                <a:effectLst>
-                  <a:outerShdw blurRad="38100" dist="38100" dir="2700000" algn="tl">
-                    <a:srgbClr val="000000">
-                      <a:alpha val="43137"/>
-                    </a:srgbClr>
-                  </a:outerShdw>
-                </a:effectLst>
-                <a:latin typeface="+mn-lt"/>
-                <a:ea typeface="+mn-ea"/>
-                <a:cs typeface="+mn-cs"/>
-              </a:defRPr>
-            </a:lvl3pPr>
-            <a:lvl4pPr marL="1187450" indent="-228600" algn="l" rtl="0" eaLnBrk="0" fontAlgn="base" hangingPunct="0">
-              <a:spcBef>
-                <a:spcPct val="20000"/>
-              </a:spcBef>
-              <a:spcAft>
-                <a:spcPct val="0"/>
-              </a:spcAft>
-              <a:buClr>
-                <a:srgbClr val="F8BD52"/>
-              </a:buClr>
-              <a:buFont typeface="Wingdings 2" pitchFamily="18" charset="2"/>
-              <a:buChar char=""/>
-              <a:defRPr sz="2600" b="1" kern="1200">
-                <a:solidFill>
-                  <a:schemeClr val="tx1">
-                    <a:lumMod val="20000"/>
-                    <a:lumOff val="80000"/>
-                  </a:schemeClr>
-                </a:solidFill>
-                <a:effectLst>
-                  <a:outerShdw blurRad="38100" dist="38100" dir="2700000" algn="tl">
-                    <a:srgbClr val="000000">
-                      <a:alpha val="43137"/>
-                    </a:srgbClr>
-                  </a:outerShdw>
-                </a:effectLst>
-                <a:latin typeface="+mn-lt"/>
-                <a:ea typeface="+mn-ea"/>
-                <a:cs typeface="+mn-cs"/>
-              </a:defRPr>
-            </a:lvl4pPr>
-            <a:lvl5pPr marL="1425575" indent="-228600" algn="l" rtl="0" eaLnBrk="0" fontAlgn="base" hangingPunct="0">
-              <a:spcBef>
-                <a:spcPct val="20000"/>
-              </a:spcBef>
-              <a:spcAft>
-                <a:spcPct val="0"/>
-              </a:spcAft>
-              <a:buClr>
-                <a:srgbClr val="46A6BD"/>
-              </a:buClr>
-              <a:buFont typeface="Wingdings 2" pitchFamily="18" charset="2"/>
-              <a:buChar char=""/>
-              <a:defRPr sz="2400" b="1" kern="1200">
-                <a:solidFill>
-                  <a:schemeClr val="tx1">
-                    <a:lumMod val="20000"/>
-                    <a:lumOff val="80000"/>
-                  </a:schemeClr>
-                </a:solidFill>
-                <a:effectLst>
-                  <a:outerShdw blurRad="38100" dist="38100" dir="2700000" algn="tl">
-                    <a:srgbClr val="000000">
-                      <a:alpha val="43137"/>
-                    </a:srgbClr>
-                  </a:outerShdw>
-                </a:effectLst>
-                <a:latin typeface="+mn-lt"/>
-                <a:ea typeface="+mn-ea"/>
-                <a:cs typeface="+mn-cs"/>
-              </a:defRPr>
-            </a:lvl5pPr>
-            <a:lvl6pPr marL="1673352" indent="-228600" algn="l" rtl="0" eaLnBrk="1" latinLnBrk="0" hangingPunct="1">
-              <a:spcBef>
-                <a:spcPct val="20000"/>
-              </a:spcBef>
-              <a:buClr>
-                <a:schemeClr val="accent6"/>
-              </a:buClr>
-              <a:buFont typeface="Wingdings 2"/>
-              <a:buChar char=""/>
-              <a:defRPr sz="1800" kern="1200">
-                <a:solidFill>
-                  <a:schemeClr val="tx1"/>
-                </a:solidFill>
-                <a:latin typeface="+mn-lt"/>
-                <a:ea typeface="+mn-ea"/>
-                <a:cs typeface="+mn-cs"/>
-              </a:defRPr>
-            </a:lvl6pPr>
-            <a:lvl7pPr marL="1911096" indent="-228600" algn="l" rtl="0" eaLnBrk="1" latinLnBrk="0" hangingPunct="1">
-              <a:spcBef>
-                <a:spcPct val="20000"/>
-              </a:spcBef>
-              <a:buClr>
-                <a:schemeClr val="tx2"/>
-              </a:buClr>
-              <a:buFont typeface="Wingdings 2"/>
-              <a:buChar char=""/>
-              <a:defRPr sz="1600" kern="1200">
-                <a:solidFill>
-                  <a:schemeClr val="tx1"/>
-                </a:solidFill>
-                <a:latin typeface="+mn-lt"/>
-                <a:ea typeface="+mn-ea"/>
-                <a:cs typeface="+mn-cs"/>
-              </a:defRPr>
-            </a:lvl7pPr>
-            <a:lvl8pPr marL="2121408" indent="-182880" algn="l" rtl="0" eaLnBrk="1" latinLnBrk="0" hangingPunct="1">
-              <a:spcBef>
-                <a:spcPct val="20000"/>
-              </a:spcBef>
-              <a:buClr>
-                <a:schemeClr val="tx2"/>
-              </a:buClr>
-              <a:buFont typeface="Wingdings 2"/>
-              <a:buChar char=""/>
-              <a:defRPr sz="1400" kern="1200">
-                <a:solidFill>
-                  <a:schemeClr val="tx1"/>
-                </a:solidFill>
-                <a:latin typeface="+mn-lt"/>
-                <a:ea typeface="+mn-ea"/>
-                <a:cs typeface="+mn-cs"/>
-              </a:defRPr>
-            </a:lvl8pPr>
-            <a:lvl9pPr marL="2322576" indent="-182880" algn="l" rtl="0" eaLnBrk="1" latinLnBrk="0" hangingPunct="1">
-              <a:spcBef>
-                <a:spcPct val="20000"/>
-              </a:spcBef>
-              <a:buClr>
-                <a:schemeClr val="tx2"/>
-              </a:buClr>
-              <a:buFont typeface="Wingdings 2"/>
-              <a:buChar char=""/>
-              <a:defRPr sz="1400" kern="1200">
-                <a:solidFill>
-                  <a:schemeClr val="tx1"/>
-                </a:solidFill>
-                <a:latin typeface="+mn-lt"/>
-                <a:ea typeface="+mn-ea"/>
-                <a:cs typeface="+mn-cs"/>
-              </a:defRPr>
-            </a:lvl9pPr>
-          </a:lstStyle>
-          <a:p>
-            <a:r>
-              <a:rPr lang="en-US" dirty="0" smtClean="0"/>
-              <a:t>Manager Technical Training</a:t>
-            </a:r>
-            <a:endParaRPr lang="en-US" dirty="0"/>
-          </a:p>
-        </p:txBody>
-      </p:sp>
-      <p:sp>
-        <p:nvSpPr>
-          <p:cNvPr id="18" name="Text Placeholder 7"/>
-          <p:cNvSpPr>
-            <a:spLocks noGrp="1"/>
-          </p:cNvSpPr>
-          <p:nvPr/>
-        </p:nvSpPr>
-        <p:spPr>
-          <a:xfrm>
-            <a:off x="469900" y="5326558"/>
-            <a:ext cx="3352800" cy="400110"/>
-          </a:xfrm>
-          <a:prstGeom prst="rect">
-            <a:avLst/>
-          </a:prstGeom>
-          <a:noFill/>
-        </p:spPr>
-        <p:txBody>
-          <a:bodyPr wrap="square" rtlCol="0">
-            <a:spAutoFit/>
-          </a:bodyPr>
-          <a:lstStyle>
-            <a:lvl1pPr marL="319088" indent="-319088" algn="l" rtl="0" eaLnBrk="0" fontAlgn="base" hangingPunct="0">
-              <a:spcBef>
-                <a:spcPct val="0"/>
-              </a:spcBef>
-              <a:spcAft>
-                <a:spcPct val="0"/>
-              </a:spcAft>
-              <a:buClr>
-                <a:schemeClr val="accent5">
-                  <a:lumMod val="40000"/>
-                  <a:lumOff val="60000"/>
-                </a:schemeClr>
-              </a:buClr>
-              <a:buSzPct val="70000"/>
-              <a:buFont typeface="Wingdings 2" pitchFamily="18" charset="2"/>
-              <a:buNone/>
-              <a:defRPr lang="en-US" sz="2000" b="1" kern="1200" dirty="0" smtClean="0">
-                <a:solidFill>
-                  <a:schemeClr val="tx2">
-                    <a:lumMod val="50000"/>
-                  </a:schemeClr>
-                </a:solidFill>
-                <a:effectLst>
-                  <a:outerShdw blurRad="38100" dist="38100" dir="2700000" algn="tl">
-                    <a:srgbClr val="000000">
-                      <a:alpha val="43137"/>
-                    </a:srgbClr>
-                  </a:outerShdw>
-                </a:effectLst>
-                <a:latin typeface="Corbel" pitchFamily="34" charset="0"/>
-                <a:ea typeface="+mn-ea"/>
-                <a:cs typeface="+mn-cs"/>
-              </a:defRPr>
-            </a:lvl1pPr>
-            <a:lvl2pPr marL="630238" indent="-273050" algn="l" rtl="0" eaLnBrk="0" fontAlgn="base" hangingPunct="0">
-              <a:spcBef>
-                <a:spcPct val="20000"/>
-              </a:spcBef>
-              <a:spcAft>
-                <a:spcPct val="0"/>
-              </a:spcAft>
-              <a:buClr>
-                <a:schemeClr val="accent2">
-                  <a:lumMod val="60000"/>
-                  <a:lumOff val="40000"/>
-                </a:schemeClr>
-              </a:buClr>
-              <a:buFont typeface="Wingdings 2" pitchFamily="18" charset="2"/>
-              <a:buChar char=""/>
-              <a:defRPr sz="3000" b="1" kern="1200">
-                <a:solidFill>
-                  <a:schemeClr val="tx1">
-                    <a:lumMod val="20000"/>
-                    <a:lumOff val="80000"/>
-                  </a:schemeClr>
-                </a:solidFill>
-                <a:effectLst>
-                  <a:outerShdw blurRad="38100" dist="38100" dir="2700000" algn="tl">
-                    <a:srgbClr val="000000">
-                      <a:alpha val="43137"/>
-                    </a:srgbClr>
-                  </a:outerShdw>
-                </a:effectLst>
-                <a:latin typeface="+mn-lt"/>
-                <a:ea typeface="+mn-ea"/>
-                <a:cs typeface="+mn-cs"/>
-              </a:defRPr>
-            </a:lvl2pPr>
-            <a:lvl3pPr marL="922338" indent="-273050" algn="l" rtl="0" eaLnBrk="0" fontAlgn="base" hangingPunct="0">
-              <a:spcBef>
-                <a:spcPct val="20000"/>
-              </a:spcBef>
-              <a:spcAft>
-                <a:spcPct val="0"/>
-              </a:spcAft>
-              <a:buClr>
-                <a:schemeClr val="tx1">
-                  <a:lumMod val="50000"/>
-                </a:schemeClr>
-              </a:buClr>
-              <a:buFont typeface="Wingdings 2" pitchFamily="18" charset="2"/>
-              <a:buChar char=""/>
-              <a:defRPr sz="2800" b="1" kern="1200">
-                <a:solidFill>
-                  <a:schemeClr val="tx1">
-                    <a:lumMod val="20000"/>
-                    <a:lumOff val="80000"/>
-                  </a:schemeClr>
-                </a:solidFill>
-                <a:effectLst>
-                  <a:outerShdw blurRad="38100" dist="38100" dir="2700000" algn="tl">
-                    <a:srgbClr val="000000">
-                      <a:alpha val="43137"/>
-                    </a:srgbClr>
-                  </a:outerShdw>
-                </a:effectLst>
-                <a:latin typeface="+mn-lt"/>
-                <a:ea typeface="+mn-ea"/>
-                <a:cs typeface="+mn-cs"/>
-              </a:defRPr>
-            </a:lvl3pPr>
-            <a:lvl4pPr marL="1187450" indent="-228600" algn="l" rtl="0" eaLnBrk="0" fontAlgn="base" hangingPunct="0">
-              <a:spcBef>
-                <a:spcPct val="20000"/>
-              </a:spcBef>
-              <a:spcAft>
-                <a:spcPct val="0"/>
-              </a:spcAft>
-              <a:buClr>
-                <a:srgbClr val="F8BD52"/>
-              </a:buClr>
-              <a:buFont typeface="Wingdings 2" pitchFamily="18" charset="2"/>
-              <a:buChar char=""/>
-              <a:defRPr sz="2600" b="1" kern="1200">
-                <a:solidFill>
-                  <a:schemeClr val="tx1">
-                    <a:lumMod val="20000"/>
-                    <a:lumOff val="80000"/>
-                  </a:schemeClr>
-                </a:solidFill>
-                <a:effectLst>
-                  <a:outerShdw blurRad="38100" dist="38100" dir="2700000" algn="tl">
-                    <a:srgbClr val="000000">
-                      <a:alpha val="43137"/>
-                    </a:srgbClr>
-                  </a:outerShdw>
-                </a:effectLst>
-                <a:latin typeface="+mn-lt"/>
-                <a:ea typeface="+mn-ea"/>
-                <a:cs typeface="+mn-cs"/>
-              </a:defRPr>
-            </a:lvl4pPr>
-            <a:lvl5pPr marL="1425575" indent="-228600" algn="l" rtl="0" eaLnBrk="0" fontAlgn="base" hangingPunct="0">
-              <a:spcBef>
-                <a:spcPct val="20000"/>
-              </a:spcBef>
-              <a:spcAft>
-                <a:spcPct val="0"/>
-              </a:spcAft>
-              <a:buClr>
-                <a:srgbClr val="46A6BD"/>
-              </a:buClr>
-              <a:buFont typeface="Wingdings 2" pitchFamily="18" charset="2"/>
-              <a:buChar char=""/>
-              <a:defRPr sz="2400" b="1" kern="1200">
-                <a:solidFill>
-                  <a:schemeClr val="tx1">
-                    <a:lumMod val="20000"/>
-                    <a:lumOff val="80000"/>
-                  </a:schemeClr>
-                </a:solidFill>
-                <a:effectLst>
-                  <a:outerShdw blurRad="38100" dist="38100" dir="2700000" algn="tl">
-                    <a:srgbClr val="000000">
-                      <a:alpha val="43137"/>
-                    </a:srgbClr>
-                  </a:outerShdw>
-                </a:effectLst>
-                <a:latin typeface="+mn-lt"/>
-                <a:ea typeface="+mn-ea"/>
-                <a:cs typeface="+mn-cs"/>
-              </a:defRPr>
-            </a:lvl5pPr>
-            <a:lvl6pPr marL="1673352" indent="-228600" algn="l" rtl="0" eaLnBrk="1" latinLnBrk="0" hangingPunct="1">
-              <a:spcBef>
-                <a:spcPct val="20000"/>
-              </a:spcBef>
-              <a:buClr>
-                <a:schemeClr val="accent6"/>
-              </a:buClr>
-              <a:buFont typeface="Wingdings 2"/>
-              <a:buChar char=""/>
-              <a:defRPr sz="1800" kern="1200">
-                <a:solidFill>
-                  <a:schemeClr val="tx1"/>
-                </a:solidFill>
-                <a:latin typeface="+mn-lt"/>
-                <a:ea typeface="+mn-ea"/>
-                <a:cs typeface="+mn-cs"/>
-              </a:defRPr>
-            </a:lvl6pPr>
-            <a:lvl7pPr marL="1911096" indent="-228600" algn="l" rtl="0" eaLnBrk="1" latinLnBrk="0" hangingPunct="1">
-              <a:spcBef>
-                <a:spcPct val="20000"/>
-              </a:spcBef>
-              <a:buClr>
-                <a:schemeClr val="tx2"/>
-              </a:buClr>
-              <a:buFont typeface="Wingdings 2"/>
-              <a:buChar char=""/>
-              <a:defRPr sz="1600" kern="1200">
-                <a:solidFill>
-                  <a:schemeClr val="tx1"/>
-                </a:solidFill>
-                <a:latin typeface="+mn-lt"/>
-                <a:ea typeface="+mn-ea"/>
-                <a:cs typeface="+mn-cs"/>
-              </a:defRPr>
-            </a:lvl7pPr>
-            <a:lvl8pPr marL="2121408" indent="-182880" algn="l" rtl="0" eaLnBrk="1" latinLnBrk="0" hangingPunct="1">
-              <a:spcBef>
-                <a:spcPct val="20000"/>
-              </a:spcBef>
-              <a:buClr>
-                <a:schemeClr val="tx2"/>
-              </a:buClr>
-              <a:buFont typeface="Wingdings 2"/>
-              <a:buChar char=""/>
-              <a:defRPr sz="1400" kern="1200">
-                <a:solidFill>
-                  <a:schemeClr val="tx1"/>
-                </a:solidFill>
-                <a:latin typeface="+mn-lt"/>
-                <a:ea typeface="+mn-ea"/>
-                <a:cs typeface="+mn-cs"/>
-              </a:defRPr>
-            </a:lvl8pPr>
-            <a:lvl9pPr marL="2322576" indent="-182880" algn="l" rtl="0" eaLnBrk="1" latinLnBrk="0" hangingPunct="1">
-              <a:spcBef>
-                <a:spcPct val="20000"/>
-              </a:spcBef>
-              <a:buClr>
-                <a:schemeClr val="tx2"/>
-              </a:buClr>
-              <a:buFont typeface="Wingdings 2"/>
-              <a:buChar char=""/>
-              <a:defRPr sz="1400" kern="1200">
-                <a:solidFill>
-                  <a:schemeClr val="tx1"/>
-                </a:solidFill>
-                <a:latin typeface="+mn-lt"/>
-                <a:ea typeface="+mn-ea"/>
-                <a:cs typeface="+mn-cs"/>
-              </a:defRPr>
-            </a:lvl9pPr>
-          </a:lstStyle>
-          <a:p>
-            <a:r>
-              <a:rPr lang="en-US" dirty="0" smtClean="0">
-                <a:hlinkClick r:id="rId4"/>
-              </a:rPr>
-              <a:t>http://nakov.com</a:t>
-            </a:r>
-            <a:r>
-              <a:rPr lang="en-US" dirty="0" smtClean="0"/>
-              <a:t> </a:t>
-            </a:r>
-            <a:endParaRPr lang="en-US" dirty="0"/>
-          </a:p>
-        </p:txBody>
-      </p:sp>
       <p:pic>
         <p:nvPicPr>
           <p:cNvPr id="21" name="Picture 2" descr="http://blogs.technet.com/cfs-file.ashx/__key/communityserver-blogs-components-weblogfiles/00-00-00-94-25/6428.SQL12_5F00_v_5F00_rgb.png"/>
@@ -8323,7 +6969,7 @@
           <p:nvPr/>
         </p:nvPicPr>
         <p:blipFill rotWithShape="1">
-          <a:blip r:embed="rId5" cstate="screen">
+          <a:blip r:embed="rId3" cstate="screen">
             <a:extLst>
               <a:ext uri="{28A0092B-C50C-407E-A947-70E740481C1C}">
                 <a14:useLocalDpi xmlns:a14="http://schemas.microsoft.com/office/drawing/2010/main"/>
@@ -8358,7 +7004,7 @@
           <p:nvPr/>
         </p:nvPicPr>
         <p:blipFill rotWithShape="1">
-          <a:blip r:embed="rId6" cstate="screen">
+          <a:blip r:embed="rId4" cstate="screen">
             <a:extLst>
               <a:ext uri="{28A0092B-C50C-407E-A947-70E740481C1C}">
                 <a14:useLocalDpi xmlns:a14="http://schemas.microsoft.com/office/drawing/2010/main"/>
@@ -8457,7 +7103,7 @@
           <p:nvPr/>
         </p:nvPicPr>
         <p:blipFill>
-          <a:blip r:embed="rId7" cstate="screen">
+          <a:blip r:embed="rId5" cstate="screen">
             <a:extLst>
               <a:ext uri="{28A0092B-C50C-407E-A947-70E740481C1C}">
                 <a14:useLocalDpi xmlns:a14="http://schemas.microsoft.com/office/drawing/2010/main" val="0"/>
@@ -8494,7 +7140,7 @@
           <p:nvPr/>
         </p:nvPicPr>
         <p:blipFill>
-          <a:blip r:embed="rId8" cstate="print">
+          <a:blip r:embed="rId6" cstate="print">
             <a:extLst>
               <a:ext uri="{28A0092B-C50C-407E-A947-70E740481C1C}">
                 <a14:useLocalDpi xmlns:a14="http://schemas.microsoft.com/office/drawing/2010/main" val="0"/>
@@ -8528,7 +7174,7 @@
           <p:nvPr/>
         </p:nvPicPr>
         <p:blipFill>
-          <a:blip r:embed="rId9" cstate="screen">
+          <a:blip r:embed="rId7" cstate="screen">
             <a:extLst>
               <a:ext uri="{28A0092B-C50C-407E-A947-70E740481C1C}">
                 <a14:useLocalDpi xmlns:a14="http://schemas.microsoft.com/office/drawing/2010/main" val="0"/>
@@ -8562,7 +7208,7 @@
           <p:nvPr/>
         </p:nvPicPr>
         <p:blipFill>
-          <a:blip r:embed="rId10" cstate="screen">
+          <a:blip r:embed="rId8" cstate="screen">
             <a:extLst>
               <a:ext uri="{28A0092B-C50C-407E-A947-70E740481C1C}">
                 <a14:useLocalDpi xmlns:a14="http://schemas.microsoft.com/office/drawing/2010/main" val="0"/>
@@ -8594,7 +7240,7 @@
           <p:nvPr/>
         </p:nvPicPr>
         <p:blipFill>
-          <a:blip r:embed="rId11">
+          <a:blip r:embed="rId9">
             <a:extLst>
               <a:ext uri="{28A0092B-C50C-407E-A947-70E740481C1C}">
                 <a14:useLocalDpi xmlns:a14="http://schemas.microsoft.com/office/drawing/2010/main"/>
@@ -8649,6 +7295,818 @@
           </a:extLst>
         </p:spPr>
       </p:pic>
+      <p:sp>
+        <p:nvSpPr>
+          <p:cNvPr id="22" name="Text Placeholder 6"/>
+          <p:cNvSpPr>
+            <a:spLocks noGrp="1"/>
+          </p:cNvSpPr>
+          <p:nvPr/>
+        </p:nvSpPr>
+        <p:spPr>
+          <a:xfrm>
+            <a:off x="380999" y="5752679"/>
+            <a:ext cx="3990513" cy="400110"/>
+          </a:xfrm>
+          <a:prstGeom prst="rect">
+            <a:avLst/>
+          </a:prstGeom>
+          <a:noFill/>
+        </p:spPr>
+        <p:txBody>
+          <a:bodyPr wrap="square" rtlCol="0">
+            <a:spAutoFit/>
+          </a:bodyPr>
+          <a:lstStyle>
+            <a:lvl1pPr marL="319088" indent="-319088" algn="l" rtl="0" eaLnBrk="0" fontAlgn="base" hangingPunct="0">
+              <a:spcBef>
+                <a:spcPct val="20000"/>
+              </a:spcBef>
+              <a:spcAft>
+                <a:spcPct val="0"/>
+              </a:spcAft>
+              <a:buClr>
+                <a:schemeClr val="accent5">
+                  <a:lumMod val="40000"/>
+                  <a:lumOff val="60000"/>
+                </a:schemeClr>
+              </a:buClr>
+              <a:buSzPct val="70000"/>
+              <a:buFont typeface="Wingdings 2" pitchFamily="18" charset="2"/>
+              <a:buNone/>
+              <a:defRPr lang="en-US" sz="2000" b="1" kern="1200" dirty="0">
+                <a:solidFill>
+                  <a:schemeClr val="tx2">
+                    <a:lumMod val="20000"/>
+                    <a:lumOff val="80000"/>
+                  </a:schemeClr>
+                </a:solidFill>
+                <a:effectLst>
+                  <a:outerShdw blurRad="38100" dist="38100" dir="2700000" algn="tl">
+                    <a:srgbClr val="000000">
+                      <a:alpha val="43137"/>
+                    </a:srgbClr>
+                  </a:outerShdw>
+                </a:effectLst>
+                <a:latin typeface="Corbel" pitchFamily="34" charset="0"/>
+                <a:ea typeface="+mn-ea"/>
+                <a:cs typeface="+mn-cs"/>
+              </a:defRPr>
+            </a:lvl1pPr>
+            <a:lvl2pPr marL="630238" indent="-273050" algn="l" rtl="0" eaLnBrk="0" fontAlgn="base" hangingPunct="0">
+              <a:spcBef>
+                <a:spcPct val="20000"/>
+              </a:spcBef>
+              <a:spcAft>
+                <a:spcPct val="0"/>
+              </a:spcAft>
+              <a:buClr>
+                <a:schemeClr val="accent2">
+                  <a:lumMod val="60000"/>
+                  <a:lumOff val="40000"/>
+                </a:schemeClr>
+              </a:buClr>
+              <a:buFont typeface="Wingdings 2" pitchFamily="18" charset="2"/>
+              <a:buChar char=""/>
+              <a:defRPr sz="3000" b="1" kern="1200">
+                <a:solidFill>
+                  <a:schemeClr val="tx1">
+                    <a:lumMod val="20000"/>
+                    <a:lumOff val="80000"/>
+                  </a:schemeClr>
+                </a:solidFill>
+                <a:effectLst>
+                  <a:outerShdw blurRad="38100" dist="38100" dir="2700000" algn="tl">
+                    <a:srgbClr val="000000">
+                      <a:alpha val="43137"/>
+                    </a:srgbClr>
+                  </a:outerShdw>
+                </a:effectLst>
+                <a:latin typeface="+mn-lt"/>
+                <a:ea typeface="+mn-ea"/>
+                <a:cs typeface="+mn-cs"/>
+              </a:defRPr>
+            </a:lvl2pPr>
+            <a:lvl3pPr marL="922338" indent="-273050" algn="l" rtl="0" eaLnBrk="0" fontAlgn="base" hangingPunct="0">
+              <a:spcBef>
+                <a:spcPct val="20000"/>
+              </a:spcBef>
+              <a:spcAft>
+                <a:spcPct val="0"/>
+              </a:spcAft>
+              <a:buClr>
+                <a:schemeClr val="tx1">
+                  <a:lumMod val="50000"/>
+                </a:schemeClr>
+              </a:buClr>
+              <a:buFont typeface="Wingdings 2" pitchFamily="18" charset="2"/>
+              <a:buChar char=""/>
+              <a:defRPr sz="2800" b="1" kern="1200">
+                <a:solidFill>
+                  <a:schemeClr val="tx1">
+                    <a:lumMod val="20000"/>
+                    <a:lumOff val="80000"/>
+                  </a:schemeClr>
+                </a:solidFill>
+                <a:effectLst>
+                  <a:outerShdw blurRad="38100" dist="38100" dir="2700000" algn="tl">
+                    <a:srgbClr val="000000">
+                      <a:alpha val="43137"/>
+                    </a:srgbClr>
+                  </a:outerShdw>
+                </a:effectLst>
+                <a:latin typeface="+mn-lt"/>
+                <a:ea typeface="+mn-ea"/>
+                <a:cs typeface="+mn-cs"/>
+              </a:defRPr>
+            </a:lvl3pPr>
+            <a:lvl4pPr marL="1187450" indent="-228600" algn="l" rtl="0" eaLnBrk="0" fontAlgn="base" hangingPunct="0">
+              <a:spcBef>
+                <a:spcPct val="20000"/>
+              </a:spcBef>
+              <a:spcAft>
+                <a:spcPct val="0"/>
+              </a:spcAft>
+              <a:buClr>
+                <a:srgbClr val="F8BD52"/>
+              </a:buClr>
+              <a:buFont typeface="Wingdings 2" pitchFamily="18" charset="2"/>
+              <a:buChar char=""/>
+              <a:defRPr sz="2600" b="1" kern="1200">
+                <a:solidFill>
+                  <a:schemeClr val="tx1">
+                    <a:lumMod val="20000"/>
+                    <a:lumOff val="80000"/>
+                  </a:schemeClr>
+                </a:solidFill>
+                <a:effectLst>
+                  <a:outerShdw blurRad="38100" dist="38100" dir="2700000" algn="tl">
+                    <a:srgbClr val="000000">
+                      <a:alpha val="43137"/>
+                    </a:srgbClr>
+                  </a:outerShdw>
+                </a:effectLst>
+                <a:latin typeface="+mn-lt"/>
+                <a:ea typeface="+mn-ea"/>
+                <a:cs typeface="+mn-cs"/>
+              </a:defRPr>
+            </a:lvl4pPr>
+            <a:lvl5pPr marL="1425575" indent="-228600" algn="l" rtl="0" eaLnBrk="0" fontAlgn="base" hangingPunct="0">
+              <a:spcBef>
+                <a:spcPct val="20000"/>
+              </a:spcBef>
+              <a:spcAft>
+                <a:spcPct val="0"/>
+              </a:spcAft>
+              <a:buClr>
+                <a:srgbClr val="46A6BD"/>
+              </a:buClr>
+              <a:buFont typeface="Wingdings 2" pitchFamily="18" charset="2"/>
+              <a:buChar char=""/>
+              <a:defRPr sz="2400" b="1" kern="1200">
+                <a:solidFill>
+                  <a:schemeClr val="tx1">
+                    <a:lumMod val="20000"/>
+                    <a:lumOff val="80000"/>
+                  </a:schemeClr>
+                </a:solidFill>
+                <a:effectLst>
+                  <a:outerShdw blurRad="38100" dist="38100" dir="2700000" algn="tl">
+                    <a:srgbClr val="000000">
+                      <a:alpha val="43137"/>
+                    </a:srgbClr>
+                  </a:outerShdw>
+                </a:effectLst>
+                <a:latin typeface="+mn-lt"/>
+                <a:ea typeface="+mn-ea"/>
+                <a:cs typeface="+mn-cs"/>
+              </a:defRPr>
+            </a:lvl5pPr>
+            <a:lvl6pPr marL="1673352" indent="-228600" algn="l" rtl="0" eaLnBrk="1" latinLnBrk="0" hangingPunct="1">
+              <a:spcBef>
+                <a:spcPct val="20000"/>
+              </a:spcBef>
+              <a:buClr>
+                <a:schemeClr val="accent6"/>
+              </a:buClr>
+              <a:buFont typeface="Wingdings 2"/>
+              <a:buChar char=""/>
+              <a:defRPr sz="1800" kern="1200">
+                <a:solidFill>
+                  <a:schemeClr val="tx1"/>
+                </a:solidFill>
+                <a:latin typeface="+mn-lt"/>
+                <a:ea typeface="+mn-ea"/>
+                <a:cs typeface="+mn-cs"/>
+              </a:defRPr>
+            </a:lvl6pPr>
+            <a:lvl7pPr marL="1911096" indent="-228600" algn="l" rtl="0" eaLnBrk="1" latinLnBrk="0" hangingPunct="1">
+              <a:spcBef>
+                <a:spcPct val="20000"/>
+              </a:spcBef>
+              <a:buClr>
+                <a:schemeClr val="tx2"/>
+              </a:buClr>
+              <a:buFont typeface="Wingdings 2"/>
+              <a:buChar char=""/>
+              <a:defRPr sz="1600" kern="1200">
+                <a:solidFill>
+                  <a:schemeClr val="tx1"/>
+                </a:solidFill>
+                <a:latin typeface="+mn-lt"/>
+                <a:ea typeface="+mn-ea"/>
+                <a:cs typeface="+mn-cs"/>
+              </a:defRPr>
+            </a:lvl7pPr>
+            <a:lvl8pPr marL="2121408" indent="-182880" algn="l" rtl="0" eaLnBrk="1" latinLnBrk="0" hangingPunct="1">
+              <a:spcBef>
+                <a:spcPct val="20000"/>
+              </a:spcBef>
+              <a:buClr>
+                <a:schemeClr val="tx2"/>
+              </a:buClr>
+              <a:buFont typeface="Wingdings 2"/>
+              <a:buChar char=""/>
+              <a:defRPr sz="1400" kern="1200">
+                <a:solidFill>
+                  <a:schemeClr val="tx1"/>
+                </a:solidFill>
+                <a:latin typeface="+mn-lt"/>
+                <a:ea typeface="+mn-ea"/>
+                <a:cs typeface="+mn-cs"/>
+              </a:defRPr>
+            </a:lvl8pPr>
+            <a:lvl9pPr marL="2322576" indent="-182880" algn="l" rtl="0" eaLnBrk="1" latinLnBrk="0" hangingPunct="1">
+              <a:spcBef>
+                <a:spcPct val="20000"/>
+              </a:spcBef>
+              <a:buClr>
+                <a:schemeClr val="tx2"/>
+              </a:buClr>
+              <a:buFont typeface="Wingdings 2"/>
+              <a:buChar char=""/>
+              <a:defRPr sz="1400" kern="1200">
+                <a:solidFill>
+                  <a:schemeClr val="tx1"/>
+                </a:solidFill>
+                <a:latin typeface="+mn-lt"/>
+                <a:ea typeface="+mn-ea"/>
+                <a:cs typeface="+mn-cs"/>
+              </a:defRPr>
+            </a:lvl9pPr>
+          </a:lstStyle>
+          <a:p>
+            <a:r>
+              <a:rPr lang="en-US" dirty="0" smtClean="0"/>
+              <a:t>Learning &amp; Development Team</a:t>
+            </a:r>
+            <a:endParaRPr lang="en-US" dirty="0"/>
+          </a:p>
+        </p:txBody>
+      </p:sp>
+      <p:sp>
+        <p:nvSpPr>
+          <p:cNvPr id="29" name="Text Placeholder 7"/>
+          <p:cNvSpPr>
+            <a:spLocks noGrp="1"/>
+          </p:cNvSpPr>
+          <p:nvPr/>
+        </p:nvSpPr>
+        <p:spPr>
+          <a:xfrm>
+            <a:off x="381000" y="6057479"/>
+            <a:ext cx="3990513" cy="369332"/>
+          </a:xfrm>
+          <a:prstGeom prst="rect">
+            <a:avLst/>
+          </a:prstGeom>
+          <a:noFill/>
+        </p:spPr>
+        <p:txBody>
+          <a:bodyPr wrap="square" rtlCol="0">
+            <a:spAutoFit/>
+          </a:bodyPr>
+          <a:lstStyle>
+            <a:lvl1pPr marL="319088" indent="-319088" algn="l" rtl="0" eaLnBrk="0" fontAlgn="base" hangingPunct="0">
+              <a:spcBef>
+                <a:spcPct val="20000"/>
+              </a:spcBef>
+              <a:spcAft>
+                <a:spcPct val="0"/>
+              </a:spcAft>
+              <a:buClr>
+                <a:schemeClr val="accent5">
+                  <a:lumMod val="40000"/>
+                  <a:lumOff val="60000"/>
+                </a:schemeClr>
+              </a:buClr>
+              <a:buSzPct val="70000"/>
+              <a:buFont typeface="Wingdings 2" pitchFamily="18" charset="2"/>
+              <a:buNone/>
+              <a:defRPr lang="en-US" sz="1800" b="1" kern="1200" dirty="0">
+                <a:solidFill>
+                  <a:schemeClr val="tx2">
+                    <a:lumMod val="20000"/>
+                    <a:lumOff val="80000"/>
+                  </a:schemeClr>
+                </a:solidFill>
+                <a:effectLst>
+                  <a:outerShdw blurRad="38100" dist="38100" dir="2700000" algn="tl">
+                    <a:srgbClr val="000000">
+                      <a:alpha val="43137"/>
+                    </a:srgbClr>
+                  </a:outerShdw>
+                </a:effectLst>
+                <a:latin typeface="Corbel" pitchFamily="34" charset="0"/>
+                <a:ea typeface="+mn-ea"/>
+                <a:cs typeface="+mn-cs"/>
+              </a:defRPr>
+            </a:lvl1pPr>
+            <a:lvl2pPr marL="630238" indent="-273050" algn="l" rtl="0" eaLnBrk="0" fontAlgn="base" hangingPunct="0">
+              <a:spcBef>
+                <a:spcPct val="20000"/>
+              </a:spcBef>
+              <a:spcAft>
+                <a:spcPct val="0"/>
+              </a:spcAft>
+              <a:buClr>
+                <a:schemeClr val="accent2">
+                  <a:lumMod val="60000"/>
+                  <a:lumOff val="40000"/>
+                </a:schemeClr>
+              </a:buClr>
+              <a:buFont typeface="Wingdings 2" pitchFamily="18" charset="2"/>
+              <a:buChar char=""/>
+              <a:defRPr sz="3000" b="1" kern="1200">
+                <a:solidFill>
+                  <a:schemeClr val="tx1">
+                    <a:lumMod val="20000"/>
+                    <a:lumOff val="80000"/>
+                  </a:schemeClr>
+                </a:solidFill>
+                <a:effectLst>
+                  <a:outerShdw blurRad="38100" dist="38100" dir="2700000" algn="tl">
+                    <a:srgbClr val="000000">
+                      <a:alpha val="43137"/>
+                    </a:srgbClr>
+                  </a:outerShdw>
+                </a:effectLst>
+                <a:latin typeface="+mn-lt"/>
+                <a:ea typeface="+mn-ea"/>
+                <a:cs typeface="+mn-cs"/>
+              </a:defRPr>
+            </a:lvl2pPr>
+            <a:lvl3pPr marL="922338" indent="-273050" algn="l" rtl="0" eaLnBrk="0" fontAlgn="base" hangingPunct="0">
+              <a:spcBef>
+                <a:spcPct val="20000"/>
+              </a:spcBef>
+              <a:spcAft>
+                <a:spcPct val="0"/>
+              </a:spcAft>
+              <a:buClr>
+                <a:schemeClr val="tx1">
+                  <a:lumMod val="50000"/>
+                </a:schemeClr>
+              </a:buClr>
+              <a:buFont typeface="Wingdings 2" pitchFamily="18" charset="2"/>
+              <a:buChar char=""/>
+              <a:defRPr sz="2800" b="1" kern="1200">
+                <a:solidFill>
+                  <a:schemeClr val="tx1">
+                    <a:lumMod val="20000"/>
+                    <a:lumOff val="80000"/>
+                  </a:schemeClr>
+                </a:solidFill>
+                <a:effectLst>
+                  <a:outerShdw blurRad="38100" dist="38100" dir="2700000" algn="tl">
+                    <a:srgbClr val="000000">
+                      <a:alpha val="43137"/>
+                    </a:srgbClr>
+                  </a:outerShdw>
+                </a:effectLst>
+                <a:latin typeface="+mn-lt"/>
+                <a:ea typeface="+mn-ea"/>
+                <a:cs typeface="+mn-cs"/>
+              </a:defRPr>
+            </a:lvl3pPr>
+            <a:lvl4pPr marL="1187450" indent="-228600" algn="l" rtl="0" eaLnBrk="0" fontAlgn="base" hangingPunct="0">
+              <a:spcBef>
+                <a:spcPct val="20000"/>
+              </a:spcBef>
+              <a:spcAft>
+                <a:spcPct val="0"/>
+              </a:spcAft>
+              <a:buClr>
+                <a:srgbClr val="F8BD52"/>
+              </a:buClr>
+              <a:buFont typeface="Wingdings 2" pitchFamily="18" charset="2"/>
+              <a:buChar char=""/>
+              <a:defRPr sz="2600" b="1" kern="1200">
+                <a:solidFill>
+                  <a:schemeClr val="tx1">
+                    <a:lumMod val="20000"/>
+                    <a:lumOff val="80000"/>
+                  </a:schemeClr>
+                </a:solidFill>
+                <a:effectLst>
+                  <a:outerShdw blurRad="38100" dist="38100" dir="2700000" algn="tl">
+                    <a:srgbClr val="000000">
+                      <a:alpha val="43137"/>
+                    </a:srgbClr>
+                  </a:outerShdw>
+                </a:effectLst>
+                <a:latin typeface="+mn-lt"/>
+                <a:ea typeface="+mn-ea"/>
+                <a:cs typeface="+mn-cs"/>
+              </a:defRPr>
+            </a:lvl4pPr>
+            <a:lvl5pPr marL="1425575" indent="-228600" algn="l" rtl="0" eaLnBrk="0" fontAlgn="base" hangingPunct="0">
+              <a:spcBef>
+                <a:spcPct val="20000"/>
+              </a:spcBef>
+              <a:spcAft>
+                <a:spcPct val="0"/>
+              </a:spcAft>
+              <a:buClr>
+                <a:srgbClr val="46A6BD"/>
+              </a:buClr>
+              <a:buFont typeface="Wingdings 2" pitchFamily="18" charset="2"/>
+              <a:buChar char=""/>
+              <a:defRPr sz="2400" b="1" kern="1200">
+                <a:solidFill>
+                  <a:schemeClr val="tx1">
+                    <a:lumMod val="20000"/>
+                    <a:lumOff val="80000"/>
+                  </a:schemeClr>
+                </a:solidFill>
+                <a:effectLst>
+                  <a:outerShdw blurRad="38100" dist="38100" dir="2700000" algn="tl">
+                    <a:srgbClr val="000000">
+                      <a:alpha val="43137"/>
+                    </a:srgbClr>
+                  </a:outerShdw>
+                </a:effectLst>
+                <a:latin typeface="+mn-lt"/>
+                <a:ea typeface="+mn-ea"/>
+                <a:cs typeface="+mn-cs"/>
+              </a:defRPr>
+            </a:lvl5pPr>
+            <a:lvl6pPr marL="1673352" indent="-228600" algn="l" rtl="0" eaLnBrk="1" latinLnBrk="0" hangingPunct="1">
+              <a:spcBef>
+                <a:spcPct val="20000"/>
+              </a:spcBef>
+              <a:buClr>
+                <a:schemeClr val="accent6"/>
+              </a:buClr>
+              <a:buFont typeface="Wingdings 2"/>
+              <a:buChar char=""/>
+              <a:defRPr sz="1800" kern="1200">
+                <a:solidFill>
+                  <a:schemeClr val="tx1"/>
+                </a:solidFill>
+                <a:latin typeface="+mn-lt"/>
+                <a:ea typeface="+mn-ea"/>
+                <a:cs typeface="+mn-cs"/>
+              </a:defRPr>
+            </a:lvl6pPr>
+            <a:lvl7pPr marL="1911096" indent="-228600" algn="l" rtl="0" eaLnBrk="1" latinLnBrk="0" hangingPunct="1">
+              <a:spcBef>
+                <a:spcPct val="20000"/>
+              </a:spcBef>
+              <a:buClr>
+                <a:schemeClr val="tx2"/>
+              </a:buClr>
+              <a:buFont typeface="Wingdings 2"/>
+              <a:buChar char=""/>
+              <a:defRPr sz="1600" kern="1200">
+                <a:solidFill>
+                  <a:schemeClr val="tx1"/>
+                </a:solidFill>
+                <a:latin typeface="+mn-lt"/>
+                <a:ea typeface="+mn-ea"/>
+                <a:cs typeface="+mn-cs"/>
+              </a:defRPr>
+            </a:lvl7pPr>
+            <a:lvl8pPr marL="2121408" indent="-182880" algn="l" rtl="0" eaLnBrk="1" latinLnBrk="0" hangingPunct="1">
+              <a:spcBef>
+                <a:spcPct val="20000"/>
+              </a:spcBef>
+              <a:buClr>
+                <a:schemeClr val="tx2"/>
+              </a:buClr>
+              <a:buFont typeface="Wingdings 2"/>
+              <a:buChar char=""/>
+              <a:defRPr sz="1400" kern="1200">
+                <a:solidFill>
+                  <a:schemeClr val="tx1"/>
+                </a:solidFill>
+                <a:latin typeface="+mn-lt"/>
+                <a:ea typeface="+mn-ea"/>
+                <a:cs typeface="+mn-cs"/>
+              </a:defRPr>
+            </a:lvl8pPr>
+            <a:lvl9pPr marL="2322576" indent="-182880" algn="l" rtl="0" eaLnBrk="1" latinLnBrk="0" hangingPunct="1">
+              <a:spcBef>
+                <a:spcPct val="20000"/>
+              </a:spcBef>
+              <a:buClr>
+                <a:schemeClr val="tx2"/>
+              </a:buClr>
+              <a:buFont typeface="Wingdings 2"/>
+              <a:buChar char=""/>
+              <a:defRPr sz="1400" kern="1200">
+                <a:solidFill>
+                  <a:schemeClr val="tx1"/>
+                </a:solidFill>
+                <a:latin typeface="+mn-lt"/>
+                <a:ea typeface="+mn-ea"/>
+                <a:cs typeface="+mn-cs"/>
+              </a:defRPr>
+            </a:lvl9pPr>
+          </a:lstStyle>
+          <a:p>
+            <a:r>
+              <a:rPr lang="en-US" dirty="0" smtClean="0">
+                <a:hlinkClick r:id="rId10"/>
+              </a:rPr>
+              <a:t>http://academy.telerik.com</a:t>
+            </a:r>
+            <a:r>
+              <a:rPr lang="en-US" dirty="0" smtClean="0"/>
+              <a:t> </a:t>
+            </a:r>
+            <a:endParaRPr lang="en-US" dirty="0"/>
+          </a:p>
+        </p:txBody>
+      </p:sp>
+      <p:sp>
+        <p:nvSpPr>
+          <p:cNvPr id="30" name="Text Placeholder 13"/>
+          <p:cNvSpPr>
+            <a:spLocks noGrp="1"/>
+          </p:cNvSpPr>
+          <p:nvPr/>
+        </p:nvSpPr>
+        <p:spPr>
+          <a:xfrm>
+            <a:off x="381000" y="5378036"/>
+            <a:ext cx="3990513" cy="461665"/>
+          </a:xfrm>
+          <a:prstGeom prst="rect">
+            <a:avLst/>
+          </a:prstGeom>
+          <a:noFill/>
+        </p:spPr>
+        <p:txBody>
+          <a:bodyPr wrap="square" rtlCol="0">
+            <a:spAutoFit/>
+          </a:bodyPr>
+          <a:lstStyle>
+            <a:lvl1pPr marL="0" indent="0" algn="l" rtl="0" eaLnBrk="0" fontAlgn="base" hangingPunct="0">
+              <a:spcBef>
+                <a:spcPct val="20000"/>
+              </a:spcBef>
+              <a:spcAft>
+                <a:spcPct val="0"/>
+              </a:spcAft>
+              <a:buClr>
+                <a:schemeClr val="accent5">
+                  <a:lumMod val="40000"/>
+                  <a:lumOff val="60000"/>
+                </a:schemeClr>
+              </a:buClr>
+              <a:buSzPct val="70000"/>
+              <a:buFont typeface="Wingdings 2" pitchFamily="18" charset="2"/>
+              <a:buNone/>
+              <a:defRPr lang="en-US" sz="2400" b="1" kern="1200" dirty="0">
+                <a:solidFill>
+                  <a:schemeClr val="tx2">
+                    <a:lumMod val="50000"/>
+                  </a:schemeClr>
+                </a:solidFill>
+                <a:effectLst>
+                  <a:outerShdw blurRad="38100" dist="38100" dir="2700000" algn="tl">
+                    <a:srgbClr val="000000">
+                      <a:alpha val="43137"/>
+                    </a:srgbClr>
+                  </a:outerShdw>
+                </a:effectLst>
+                <a:latin typeface="Corbel" pitchFamily="34" charset="0"/>
+                <a:ea typeface="+mn-ea"/>
+                <a:cs typeface="+mn-cs"/>
+              </a:defRPr>
+            </a:lvl1pPr>
+            <a:lvl2pPr marL="630238" indent="-273050" algn="l" rtl="0" eaLnBrk="0" fontAlgn="base" hangingPunct="0">
+              <a:spcBef>
+                <a:spcPct val="20000"/>
+              </a:spcBef>
+              <a:spcAft>
+                <a:spcPct val="0"/>
+              </a:spcAft>
+              <a:buClr>
+                <a:schemeClr val="accent2">
+                  <a:lumMod val="60000"/>
+                  <a:lumOff val="40000"/>
+                </a:schemeClr>
+              </a:buClr>
+              <a:buFont typeface="Wingdings 2" pitchFamily="18" charset="2"/>
+              <a:buChar char=""/>
+              <a:defRPr sz="3000" b="1" kern="1200">
+                <a:solidFill>
+                  <a:schemeClr val="tx1">
+                    <a:lumMod val="20000"/>
+                    <a:lumOff val="80000"/>
+                  </a:schemeClr>
+                </a:solidFill>
+                <a:effectLst>
+                  <a:outerShdw blurRad="38100" dist="38100" dir="2700000" algn="tl">
+                    <a:srgbClr val="000000">
+                      <a:alpha val="43137"/>
+                    </a:srgbClr>
+                  </a:outerShdw>
+                </a:effectLst>
+                <a:latin typeface="+mn-lt"/>
+                <a:ea typeface="+mn-ea"/>
+                <a:cs typeface="+mn-cs"/>
+              </a:defRPr>
+            </a:lvl2pPr>
+            <a:lvl3pPr marL="922338" indent="-273050" algn="l" rtl="0" eaLnBrk="0" fontAlgn="base" hangingPunct="0">
+              <a:spcBef>
+                <a:spcPct val="20000"/>
+              </a:spcBef>
+              <a:spcAft>
+                <a:spcPct val="0"/>
+              </a:spcAft>
+              <a:buClr>
+                <a:schemeClr val="tx1">
+                  <a:lumMod val="50000"/>
+                </a:schemeClr>
+              </a:buClr>
+              <a:buFont typeface="Wingdings 2" pitchFamily="18" charset="2"/>
+              <a:buChar char=""/>
+              <a:defRPr sz="2800" b="1" kern="1200">
+                <a:solidFill>
+                  <a:schemeClr val="tx1">
+                    <a:lumMod val="20000"/>
+                    <a:lumOff val="80000"/>
+                  </a:schemeClr>
+                </a:solidFill>
+                <a:effectLst>
+                  <a:outerShdw blurRad="38100" dist="38100" dir="2700000" algn="tl">
+                    <a:srgbClr val="000000">
+                      <a:alpha val="43137"/>
+                    </a:srgbClr>
+                  </a:outerShdw>
+                </a:effectLst>
+                <a:latin typeface="+mn-lt"/>
+                <a:ea typeface="+mn-ea"/>
+                <a:cs typeface="+mn-cs"/>
+              </a:defRPr>
+            </a:lvl3pPr>
+            <a:lvl4pPr marL="1187450" indent="-228600" algn="l" rtl="0" eaLnBrk="0" fontAlgn="base" hangingPunct="0">
+              <a:spcBef>
+                <a:spcPct val="20000"/>
+              </a:spcBef>
+              <a:spcAft>
+                <a:spcPct val="0"/>
+              </a:spcAft>
+              <a:buClr>
+                <a:srgbClr val="F8BD52"/>
+              </a:buClr>
+              <a:buFont typeface="Wingdings 2" pitchFamily="18" charset="2"/>
+              <a:buChar char=""/>
+              <a:defRPr sz="2600" b="1" kern="1200">
+                <a:solidFill>
+                  <a:schemeClr val="tx1">
+                    <a:lumMod val="20000"/>
+                    <a:lumOff val="80000"/>
+                  </a:schemeClr>
+                </a:solidFill>
+                <a:effectLst>
+                  <a:outerShdw blurRad="38100" dist="38100" dir="2700000" algn="tl">
+                    <a:srgbClr val="000000">
+                      <a:alpha val="43137"/>
+                    </a:srgbClr>
+                  </a:outerShdw>
+                </a:effectLst>
+                <a:latin typeface="+mn-lt"/>
+                <a:ea typeface="+mn-ea"/>
+                <a:cs typeface="+mn-cs"/>
+              </a:defRPr>
+            </a:lvl4pPr>
+            <a:lvl5pPr marL="1425575" indent="-228600" algn="l" rtl="0" eaLnBrk="0" fontAlgn="base" hangingPunct="0">
+              <a:spcBef>
+                <a:spcPct val="20000"/>
+              </a:spcBef>
+              <a:spcAft>
+                <a:spcPct val="0"/>
+              </a:spcAft>
+              <a:buClr>
+                <a:srgbClr val="46A6BD"/>
+              </a:buClr>
+              <a:buFont typeface="Wingdings 2" pitchFamily="18" charset="2"/>
+              <a:buChar char=""/>
+              <a:defRPr sz="2400" b="1" kern="1200">
+                <a:solidFill>
+                  <a:schemeClr val="tx1">
+                    <a:lumMod val="20000"/>
+                    <a:lumOff val="80000"/>
+                  </a:schemeClr>
+                </a:solidFill>
+                <a:effectLst>
+                  <a:outerShdw blurRad="38100" dist="38100" dir="2700000" algn="tl">
+                    <a:srgbClr val="000000">
+                      <a:alpha val="43137"/>
+                    </a:srgbClr>
+                  </a:outerShdw>
+                </a:effectLst>
+                <a:latin typeface="+mn-lt"/>
+                <a:ea typeface="+mn-ea"/>
+                <a:cs typeface="+mn-cs"/>
+              </a:defRPr>
+            </a:lvl5pPr>
+            <a:lvl6pPr marL="1673352" indent="-228600" algn="l" rtl="0" eaLnBrk="1" latinLnBrk="0" hangingPunct="1">
+              <a:spcBef>
+                <a:spcPct val="20000"/>
+              </a:spcBef>
+              <a:buClr>
+                <a:schemeClr val="accent6"/>
+              </a:buClr>
+              <a:buFont typeface="Wingdings 2"/>
+              <a:buChar char=""/>
+              <a:defRPr sz="1800" kern="1200">
+                <a:solidFill>
+                  <a:schemeClr val="tx1"/>
+                </a:solidFill>
+                <a:latin typeface="+mn-lt"/>
+                <a:ea typeface="+mn-ea"/>
+                <a:cs typeface="+mn-cs"/>
+              </a:defRPr>
+            </a:lvl6pPr>
+            <a:lvl7pPr marL="1911096" indent="-228600" algn="l" rtl="0" eaLnBrk="1" latinLnBrk="0" hangingPunct="1">
+              <a:spcBef>
+                <a:spcPct val="20000"/>
+              </a:spcBef>
+              <a:buClr>
+                <a:schemeClr val="tx2"/>
+              </a:buClr>
+              <a:buFont typeface="Wingdings 2"/>
+              <a:buChar char=""/>
+              <a:defRPr sz="1600" kern="1200">
+                <a:solidFill>
+                  <a:schemeClr val="tx1"/>
+                </a:solidFill>
+                <a:latin typeface="+mn-lt"/>
+                <a:ea typeface="+mn-ea"/>
+                <a:cs typeface="+mn-cs"/>
+              </a:defRPr>
+            </a:lvl7pPr>
+            <a:lvl8pPr marL="2121408" indent="-182880" algn="l" rtl="0" eaLnBrk="1" latinLnBrk="0" hangingPunct="1">
+              <a:spcBef>
+                <a:spcPct val="20000"/>
+              </a:spcBef>
+              <a:buClr>
+                <a:schemeClr val="tx2"/>
+              </a:buClr>
+              <a:buFont typeface="Wingdings 2"/>
+              <a:buChar char=""/>
+              <a:defRPr sz="1400" kern="1200">
+                <a:solidFill>
+                  <a:schemeClr val="tx1"/>
+                </a:solidFill>
+                <a:latin typeface="+mn-lt"/>
+                <a:ea typeface="+mn-ea"/>
+                <a:cs typeface="+mn-cs"/>
+              </a:defRPr>
+            </a:lvl8pPr>
+            <a:lvl9pPr marL="2322576" indent="-182880" algn="l" rtl="0" eaLnBrk="1" latinLnBrk="0" hangingPunct="1">
+              <a:spcBef>
+                <a:spcPct val="20000"/>
+              </a:spcBef>
+              <a:buClr>
+                <a:schemeClr val="tx2"/>
+              </a:buClr>
+              <a:buFont typeface="Wingdings 2"/>
+              <a:buChar char=""/>
+              <a:defRPr sz="1400" kern="1200">
+                <a:solidFill>
+                  <a:schemeClr val="tx1"/>
+                </a:solidFill>
+                <a:latin typeface="+mn-lt"/>
+                <a:ea typeface="+mn-ea"/>
+                <a:cs typeface="+mn-cs"/>
+              </a:defRPr>
+            </a:lvl9pPr>
+          </a:lstStyle>
+          <a:p>
+            <a:r>
+              <a:rPr lang="en-US" dirty="0" smtClean="0"/>
+              <a:t>Telerik Software Academy</a:t>
+            </a:r>
+            <a:endParaRPr lang="en-US" dirty="0"/>
+          </a:p>
+        </p:txBody>
+      </p:sp>
     </p:spTree>
     <p:extLst>
       <p:ext uri="{BB962C8B-B14F-4D97-AF65-F5344CB8AC3E}">
@@ -10582,7 +10040,7 @@
           <a:graphicData uri="http://schemas.openxmlformats.org/presentationml/2006/ole">
             <mc:AlternateContent xmlns:mc="http://schemas.openxmlformats.org/markup-compatibility/2006">
               <mc:Choice xmlns:v="urn:schemas-microsoft-com:vml" Requires="v">
-                <p:oleObj spid="_x0000_s1098" name="Visio" r:id="rId3" imgW="1109700" imgH="1126825" progId="Visio.Drawing.11">
+                <p:oleObj spid="_x0000_s1126" name="Visio" r:id="rId3" imgW="1109700" imgH="1126825" progId="Visio.Drawing.11">
                   <p:embed/>
                 </p:oleObj>
               </mc:Choice>
@@ -10970,7 +10428,7 @@
           <a:graphicData uri="http://schemas.openxmlformats.org/presentationml/2006/ole">
             <mc:AlternateContent xmlns:mc="http://schemas.openxmlformats.org/markup-compatibility/2006">
               <mc:Choice xmlns:v="urn:schemas-microsoft-com:vml" Requires="v">
-                <p:oleObj spid="_x0000_s1099" name="Visio" r:id="rId5" imgW="1109688" imgH="1126933" progId="Visio.Drawing.11">
+                <p:oleObj spid="_x0000_s1127" name="Visio" r:id="rId5" imgW="1109688" imgH="1126933" progId="Visio.Drawing.11">
                   <p:embed/>
                 </p:oleObj>
               </mc:Choice>
@@ -11063,7 +10521,7 @@
           <a:graphicData uri="http://schemas.openxmlformats.org/presentationml/2006/ole">
             <mc:AlternateContent xmlns:mc="http://schemas.openxmlformats.org/markup-compatibility/2006">
               <mc:Choice xmlns:v="urn:schemas-microsoft-com:vml" Requires="v">
-                <p:oleObj spid="_x0000_s1100" name="Visio" r:id="rId7" imgW="1109688" imgH="1126933" progId="Visio.Drawing.11">
+                <p:oleObj spid="_x0000_s1128" name="Visio" r:id="rId7" imgW="1109688" imgH="1126933" progId="Visio.Drawing.11">
                   <p:embed/>
                 </p:oleObj>
               </mc:Choice>
@@ -11156,7 +10614,7 @@
           <a:graphicData uri="http://schemas.openxmlformats.org/presentationml/2006/ole">
             <mc:AlternateContent xmlns:mc="http://schemas.openxmlformats.org/markup-compatibility/2006">
               <mc:Choice xmlns:v="urn:schemas-microsoft-com:vml" Requires="v">
-                <p:oleObj spid="_x0000_s1101" name="Visio" r:id="rId9" imgW="1109688" imgH="1126933" progId="Visio.Drawing.11">
+                <p:oleObj spid="_x0000_s1129" name="Visio" r:id="rId9" imgW="1109688" imgH="1126933" progId="Visio.Drawing.11">
                   <p:embed/>
                 </p:oleObj>
               </mc:Choice>
@@ -23517,7 +22975,19 @@
             </a:pPr>
             <a:r>
               <a:rPr lang="en-US" dirty="0" smtClean="0"/>
-              <a:t>If there is no free connection in the pool, a now connection is established</a:t>
+              <a:t>If there is no free connection in the pool, </a:t>
+            </a:r>
+            <a:r>
+              <a:rPr lang="en-US" smtClean="0"/>
+              <a:t>a </a:t>
+            </a:r>
+            <a:r>
+              <a:rPr lang="en-US" smtClean="0"/>
+              <a:t>new </a:t>
+            </a:r>
+            <a:r>
+              <a:rPr lang="en-US" dirty="0" smtClean="0"/>
+              <a:t>connection is established</a:t>
             </a:r>
             <a:endParaRPr lang="bg-BG" dirty="0" smtClean="0"/>
           </a:p>
@@ -35586,7 +35056,7 @@
         </p:nvSpPr>
         <p:spPr bwMode="auto">
           <a:xfrm>
-            <a:off x="817054" y="3440668"/>
+            <a:off x="817054" y="3276600"/>
             <a:ext cx="7510112" cy="369332"/>
           </a:xfrm>
           <a:prstGeom prst="rect">
@@ -35657,7 +35127,7 @@
         </p:nvSpPr>
         <p:spPr bwMode="auto">
           <a:xfrm>
-            <a:off x="817562" y="5124271"/>
+            <a:off x="817562" y="5029200"/>
             <a:ext cx="7488238" cy="1323439"/>
           </a:xfrm>
           <a:prstGeom prst="rect">
@@ -44510,10 +43980,10 @@
                   </a:schemeClr>
                 </a:solidFill>
               </a:rPr>
-              <a:t>Disconnected data access </a:t>
-            </a:r>
-            <a:r>
-              <a:rPr lang="en-US" dirty="0">
+              <a:t>Disconnected data </a:t>
+            </a:r>
+            <a:r>
+              <a:rPr lang="en-US" smtClean="0">
                 <a:solidFill>
                   <a:schemeClr val="accent5">
                     <a:lumMod val="20000"/>
@@ -44521,10 +43991,21 @@
                   </a:schemeClr>
                 </a:solidFill>
               </a:rPr>
+              <a:t>access </a:t>
+            </a:r>
+            <a:r>
+              <a:rPr lang="en-US" smtClean="0">
+                <a:solidFill>
+                  <a:schemeClr val="accent5">
+                    <a:lumMod val="20000"/>
+                    <a:lumOff val="80000"/>
+                  </a:schemeClr>
+                </a:solidFill>
+              </a:rPr>
               <a:t>model </a:t>
             </a:r>
             <a:r>
-              <a:rPr lang="en-US" dirty="0" smtClean="0">
+              <a:rPr lang="en-US" smtClean="0">
                 <a:solidFill>
                   <a:schemeClr val="tx1">
                     <a:lumMod val="40000"/>
@@ -44548,7 +44029,7 @@
               <a:t>DataSet</a:t>
             </a:r>
             <a:r>
-              <a:rPr lang="en-US" dirty="0" smtClean="0">
+              <a:rPr lang="en-US" smtClean="0">
                 <a:solidFill>
                   <a:schemeClr val="tx1">
                     <a:lumMod val="40000"/>
@@ -44558,7 +44039,7 @@
               </a:rPr>
               <a:t>)</a:t>
             </a:r>
-            <a:endParaRPr lang="en-US" dirty="0" smtClean="0">
+            <a:endParaRPr lang="en-US" smtClean="0">
               <a:solidFill>
                 <a:schemeClr val="accent5">
                   <a:lumMod val="20000"/>
@@ -44570,23 +44051,27 @@
           <a:p>
             <a:pPr lvl="1"/>
             <a:r>
+              <a:rPr lang="en-US" smtClean="0"/>
+              <a:t>A subset of the central database</a:t>
+            </a:r>
+            <a:r>
+              <a:rPr lang="bg-BG" smtClean="0"/>
+              <a:t> </a:t>
+            </a:r>
+            <a:r>
+              <a:rPr lang="en-US" smtClean="0"/>
+              <a:t>is copied locally at the client and he works with the copy</a:t>
+            </a:r>
+          </a:p>
+          <a:p>
+            <a:pPr lvl="1"/>
+            <a:r>
+              <a:rPr lang="en-US" smtClean="0"/>
+              <a:t>Database </a:t>
+            </a:r>
+            <a:r>
               <a:rPr lang="en-US" dirty="0" smtClean="0"/>
-              <a:t>A subset of the central database</a:t>
-            </a:r>
-            <a:r>
-              <a:rPr lang="bg-BG" dirty="0" smtClean="0"/>
-              <a:t> </a:t>
-            </a:r>
-            <a:r>
-              <a:rPr lang="en-US" dirty="0" smtClean="0"/>
-              <a:t>is copied locally at the client and he works with the copy</a:t>
-            </a:r>
-          </a:p>
-          <a:p>
-            <a:pPr lvl="1"/>
-            <a:r>
-              <a:rPr lang="en-US" dirty="0" smtClean="0"/>
-              <a:t>Database synchronization is done offline</a:t>
+              <a:t>synchronization is done offline</a:t>
             </a:r>
           </a:p>
           <a:p>
@@ -46029,7 +45514,7 @@
           <a:lstStyle/>
           <a:p>
             <a:r>
-              <a:rPr lang="en-US" dirty="0" smtClean="0">
+              <a:rPr lang="en-US" smtClean="0">
                 <a:solidFill>
                   <a:schemeClr val="accent5">
                     <a:lumMod val="20000"/>
@@ -46037,7 +45522,18 @@
                   </a:schemeClr>
                 </a:solidFill>
               </a:rPr>
-              <a:t>ORM data access </a:t>
+              <a:t>Object-Relational Mapping </a:t>
+            </a:r>
+            <a:r>
+              <a:rPr lang="en-US" dirty="0" smtClean="0">
+                <a:solidFill>
+                  <a:schemeClr val="accent5">
+                    <a:lumMod val="20000"/>
+                    <a:lumOff val="80000"/>
+                  </a:schemeClr>
+                </a:solidFill>
+              </a:rPr>
+              <a:t>data access </a:t>
             </a:r>
             <a:r>
               <a:rPr lang="en-US" dirty="0">
@@ -46088,7 +45584,11 @@
             <a:pPr lvl="1"/>
             <a:r>
               <a:rPr lang="en-US" dirty="0" smtClean="0"/>
-              <a:t>Can operate in both connected and disconnected modes</a:t>
+              <a:t>Can operate in both connected and disconnected </a:t>
+            </a:r>
+            <a:r>
+              <a:rPr lang="en-US" dirty="0" smtClean="0"/>
+              <a:t>models</a:t>
             </a:r>
             <a:endParaRPr lang="en-US" dirty="0"/>
           </a:p>
@@ -46133,7 +45633,7 @@
         </p:nvSpPr>
         <p:spPr bwMode="auto">
           <a:xfrm>
-            <a:off x="3821114" y="4800600"/>
+            <a:off x="3821114" y="4953000"/>
             <a:ext cx="2351086" cy="1295400"/>
           </a:xfrm>
           <a:prstGeom prst="ellipse">
@@ -46253,7 +45753,7 @@
         </p:nvSpPr>
         <p:spPr bwMode="auto">
           <a:xfrm>
-            <a:off x="754724" y="4808538"/>
+            <a:off x="754724" y="4960938"/>
             <a:ext cx="2159000" cy="1287462"/>
           </a:xfrm>
           <a:prstGeom prst="roundRect">
@@ -46421,7 +45921,7 @@
         </p:nvSpPr>
         <p:spPr bwMode="auto">
           <a:xfrm>
-            <a:off x="3029281" y="5458454"/>
+            <a:off x="3029281" y="5610854"/>
             <a:ext cx="685800" cy="0"/>
           </a:xfrm>
           <a:prstGeom prst="line">
@@ -46459,7 +45959,7 @@
         </p:nvSpPr>
         <p:spPr bwMode="auto">
           <a:xfrm>
-            <a:off x="6291114" y="5465134"/>
+            <a:off x="6291114" y="5617534"/>
             <a:ext cx="687387" cy="0"/>
           </a:xfrm>
           <a:prstGeom prst="line">
@@ -46510,7 +46010,7 @@
         </p:blipFill>
         <p:spPr bwMode="auto">
           <a:xfrm>
-            <a:off x="6934200" y="4800600"/>
+            <a:off x="6934200" y="4953000"/>
             <a:ext cx="1676400" cy="1295400"/>
           </a:xfrm>
           <a:prstGeom prst="rect">
@@ -46529,7 +46029,7 @@
         </p:nvSpPr>
         <p:spPr bwMode="auto">
           <a:xfrm>
-            <a:off x="7054701" y="6128468"/>
+            <a:off x="7054701" y="6280868"/>
             <a:ext cx="1447832" cy="424732"/>
           </a:xfrm>
           <a:prstGeom prst="rect">

</xml_diff>